<commit_message>
presentation (almost) final copy
</commit_message>
<xml_diff>
--- a/presentation.pptx
+++ b/presentation.pptx
@@ -4,6 +4,9 @@
   <p:sldMasterIdLst>
     <p:sldMasterId id="2147483960" r:id="rId1"/>
   </p:sldMasterIdLst>
+  <p:notesMasterIdLst>
+    <p:notesMasterId r:id="rId15"/>
+  </p:notesMasterIdLst>
   <p:sldIdLst>
     <p:sldId id="256" r:id="rId2"/>
     <p:sldId id="257" r:id="rId3"/>
@@ -12,10 +15,12 @@
     <p:sldId id="260" r:id="rId6"/>
     <p:sldId id="261" r:id="rId7"/>
     <p:sldId id="262" r:id="rId8"/>
-    <p:sldId id="263" r:id="rId9"/>
-    <p:sldId id="264" r:id="rId10"/>
-    <p:sldId id="265" r:id="rId11"/>
-    <p:sldId id="266" r:id="rId12"/>
+    <p:sldId id="267" r:id="rId9"/>
+    <p:sldId id="263" r:id="rId10"/>
+    <p:sldId id="264" r:id="rId11"/>
+    <p:sldId id="265" r:id="rId12"/>
+    <p:sldId id="268" r:id="rId13"/>
+    <p:sldId id="266" r:id="rId14"/>
   </p:sldIdLst>
   <p:sldSz cx="9144000" cy="6858000" type="screen4x3"/>
   <p:notesSz cx="6858000" cy="9144000"/>
@@ -115,6 +120,440 @@
     </a:lvl9pPr>
   </p:defaultTextStyle>
 </p:presentation>
+</file>
+
+<file path=ppt/notesMasters/notesMaster1.xml><?xml version="1.0" encoding="utf-8"?>
+<p:notesMaster xmlns:a="http://schemas.openxmlformats.org/drawingml/2006/main" xmlns:r="http://schemas.openxmlformats.org/officeDocument/2006/relationships" xmlns:p="http://schemas.openxmlformats.org/presentationml/2006/main">
+  <p:cSld>
+    <p:bg>
+      <p:bgRef idx="1001">
+        <a:schemeClr val="bg1"/>
+      </p:bgRef>
+    </p:bg>
+    <p:spTree>
+      <p:nvGrpSpPr>
+        <p:cNvPr id="1" name=""/>
+        <p:cNvGrpSpPr/>
+        <p:nvPr/>
+      </p:nvGrpSpPr>
+      <p:grpSpPr>
+        <a:xfrm>
+          <a:off x="0" y="0"/>
+          <a:ext cx="0" cy="0"/>
+          <a:chOff x="0" y="0"/>
+          <a:chExt cx="0" cy="0"/>
+        </a:xfrm>
+      </p:grpSpPr>
+      <p:sp>
+        <p:nvSpPr>
+          <p:cNvPr id="2" name="Header Placeholder 1"/>
+          <p:cNvSpPr>
+            <a:spLocks noGrp="1"/>
+          </p:cNvSpPr>
+          <p:nvPr>
+            <p:ph type="hdr" sz="quarter"/>
+          </p:nvPr>
+        </p:nvSpPr>
+        <p:spPr>
+          <a:xfrm>
+            <a:off x="0" y="0"/>
+            <a:ext cx="2971800" cy="457200"/>
+          </a:xfrm>
+          <a:prstGeom prst="rect">
+            <a:avLst/>
+          </a:prstGeom>
+        </p:spPr>
+        <p:txBody>
+          <a:bodyPr vert="horz" lIns="91440" tIns="45720" rIns="91440" bIns="45720" rtlCol="0"/>
+          <a:lstStyle>
+            <a:lvl1pPr algn="l">
+              <a:defRPr sz="1200"/>
+            </a:lvl1pPr>
+          </a:lstStyle>
+          <a:p>
+            <a:endParaRPr lang="en-US"/>
+          </a:p>
+        </p:txBody>
+      </p:sp>
+      <p:sp>
+        <p:nvSpPr>
+          <p:cNvPr id="3" name="Date Placeholder 2"/>
+          <p:cNvSpPr>
+            <a:spLocks noGrp="1"/>
+          </p:cNvSpPr>
+          <p:nvPr>
+            <p:ph type="dt" idx="1"/>
+          </p:nvPr>
+        </p:nvSpPr>
+        <p:spPr>
+          <a:xfrm>
+            <a:off x="3884613" y="0"/>
+            <a:ext cx="2971800" cy="457200"/>
+          </a:xfrm>
+          <a:prstGeom prst="rect">
+            <a:avLst/>
+          </a:prstGeom>
+        </p:spPr>
+        <p:txBody>
+          <a:bodyPr vert="horz" lIns="91440" tIns="45720" rIns="91440" bIns="45720" rtlCol="0"/>
+          <a:lstStyle>
+            <a:lvl1pPr algn="r">
+              <a:defRPr sz="1200"/>
+            </a:lvl1pPr>
+          </a:lstStyle>
+          <a:p>
+            <a:fld id="{E62A49F0-F214-4DF1-8A38-4D3BDA4DFCBF}" type="datetimeFigureOut">
+              <a:rPr lang="en-US" smtClean="0"/>
+              <a:t>5/7/2014</a:t>
+            </a:fld>
+            <a:endParaRPr lang="en-US"/>
+          </a:p>
+        </p:txBody>
+      </p:sp>
+      <p:sp>
+        <p:nvSpPr>
+          <p:cNvPr id="4" name="Slide Image Placeholder 3"/>
+          <p:cNvSpPr>
+            <a:spLocks noGrp="1" noRot="1" noChangeAspect="1"/>
+          </p:cNvSpPr>
+          <p:nvPr>
+            <p:ph type="sldImg" idx="2"/>
+          </p:nvPr>
+        </p:nvSpPr>
+        <p:spPr>
+          <a:xfrm>
+            <a:off x="1143000" y="685800"/>
+            <a:ext cx="4572000" cy="3429000"/>
+          </a:xfrm>
+          <a:prstGeom prst="rect">
+            <a:avLst/>
+          </a:prstGeom>
+          <a:noFill/>
+          <a:ln w="12700">
+            <a:solidFill>
+              <a:prstClr val="black"/>
+            </a:solidFill>
+          </a:ln>
+        </p:spPr>
+        <p:txBody>
+          <a:bodyPr vert="horz" lIns="91440" tIns="45720" rIns="91440" bIns="45720" rtlCol="0" anchor="ctr"/>
+          <a:lstStyle/>
+          <a:p>
+            <a:endParaRPr lang="en-US"/>
+          </a:p>
+        </p:txBody>
+      </p:sp>
+      <p:sp>
+        <p:nvSpPr>
+          <p:cNvPr id="5" name="Notes Placeholder 4"/>
+          <p:cNvSpPr>
+            <a:spLocks noGrp="1"/>
+          </p:cNvSpPr>
+          <p:nvPr>
+            <p:ph type="body" sz="quarter" idx="3"/>
+          </p:nvPr>
+        </p:nvSpPr>
+        <p:spPr>
+          <a:xfrm>
+            <a:off x="685800" y="4343400"/>
+            <a:ext cx="5486400" cy="4114800"/>
+          </a:xfrm>
+          <a:prstGeom prst="rect">
+            <a:avLst/>
+          </a:prstGeom>
+        </p:spPr>
+        <p:txBody>
+          <a:bodyPr vert="horz" lIns="91440" tIns="45720" rIns="91440" bIns="45720" rtlCol="0"/>
+          <a:lstStyle/>
+          <a:p>
+            <a:pPr lvl="0"/>
+            <a:r>
+              <a:rPr lang="en-US" smtClean="0"/>
+              <a:t>Click to edit Master text styles</a:t>
+            </a:r>
+          </a:p>
+          <a:p>
+            <a:pPr lvl="1"/>
+            <a:r>
+              <a:rPr lang="en-US" smtClean="0"/>
+              <a:t>Second level</a:t>
+            </a:r>
+          </a:p>
+          <a:p>
+            <a:pPr lvl="2"/>
+            <a:r>
+              <a:rPr lang="en-US" smtClean="0"/>
+              <a:t>Third level</a:t>
+            </a:r>
+          </a:p>
+          <a:p>
+            <a:pPr lvl="3"/>
+            <a:r>
+              <a:rPr lang="en-US" smtClean="0"/>
+              <a:t>Fourth level</a:t>
+            </a:r>
+          </a:p>
+          <a:p>
+            <a:pPr lvl="4"/>
+            <a:r>
+              <a:rPr lang="en-US" smtClean="0"/>
+              <a:t>Fifth level</a:t>
+            </a:r>
+            <a:endParaRPr lang="en-US"/>
+          </a:p>
+        </p:txBody>
+      </p:sp>
+      <p:sp>
+        <p:nvSpPr>
+          <p:cNvPr id="6" name="Footer Placeholder 5"/>
+          <p:cNvSpPr>
+            <a:spLocks noGrp="1"/>
+          </p:cNvSpPr>
+          <p:nvPr>
+            <p:ph type="ftr" sz="quarter" idx="4"/>
+          </p:nvPr>
+        </p:nvSpPr>
+        <p:spPr>
+          <a:xfrm>
+            <a:off x="0" y="8685213"/>
+            <a:ext cx="2971800" cy="457200"/>
+          </a:xfrm>
+          <a:prstGeom prst="rect">
+            <a:avLst/>
+          </a:prstGeom>
+        </p:spPr>
+        <p:txBody>
+          <a:bodyPr vert="horz" lIns="91440" tIns="45720" rIns="91440" bIns="45720" rtlCol="0" anchor="b"/>
+          <a:lstStyle>
+            <a:lvl1pPr algn="l">
+              <a:defRPr sz="1200"/>
+            </a:lvl1pPr>
+          </a:lstStyle>
+          <a:p>
+            <a:endParaRPr lang="en-US"/>
+          </a:p>
+        </p:txBody>
+      </p:sp>
+      <p:sp>
+        <p:nvSpPr>
+          <p:cNvPr id="7" name="Slide Number Placeholder 6"/>
+          <p:cNvSpPr>
+            <a:spLocks noGrp="1"/>
+          </p:cNvSpPr>
+          <p:nvPr>
+            <p:ph type="sldNum" sz="quarter" idx="5"/>
+          </p:nvPr>
+        </p:nvSpPr>
+        <p:spPr>
+          <a:xfrm>
+            <a:off x="3884613" y="8685213"/>
+            <a:ext cx="2971800" cy="457200"/>
+          </a:xfrm>
+          <a:prstGeom prst="rect">
+            <a:avLst/>
+          </a:prstGeom>
+        </p:spPr>
+        <p:txBody>
+          <a:bodyPr vert="horz" lIns="91440" tIns="45720" rIns="91440" bIns="45720" rtlCol="0" anchor="b"/>
+          <a:lstStyle>
+            <a:lvl1pPr algn="r">
+              <a:defRPr sz="1200"/>
+            </a:lvl1pPr>
+          </a:lstStyle>
+          <a:p>
+            <a:fld id="{D1E1CCD8-C8BF-4840-9295-22A135C012D6}" type="slidenum">
+              <a:rPr lang="en-US" smtClean="0"/>
+              <a:t>‹#›</a:t>
+            </a:fld>
+            <a:endParaRPr lang="en-US"/>
+          </a:p>
+        </p:txBody>
+      </p:sp>
+    </p:spTree>
+    <p:extLst>
+      <p:ext uri="{BB962C8B-B14F-4D97-AF65-F5344CB8AC3E}">
+        <p14:creationId xmlns:p14="http://schemas.microsoft.com/office/powerpoint/2010/main" val="3662260136"/>
+      </p:ext>
+    </p:extLst>
+  </p:cSld>
+  <p:clrMap bg1="lt1" tx1="dk1" bg2="lt2" tx2="dk2" accent1="accent1" accent2="accent2" accent3="accent3" accent4="accent4" accent5="accent5" accent6="accent6" hlink="hlink" folHlink="folHlink"/>
+  <p:notesStyle>
+    <a:lvl1pPr marL="0" algn="l" defTabSz="914400" rtl="0" eaLnBrk="1" latinLnBrk="0" hangingPunct="1">
+      <a:defRPr sz="1200" kern="1200">
+        <a:solidFill>
+          <a:schemeClr val="tx1"/>
+        </a:solidFill>
+        <a:latin typeface="+mn-lt"/>
+        <a:ea typeface="+mn-ea"/>
+        <a:cs typeface="+mn-cs"/>
+      </a:defRPr>
+    </a:lvl1pPr>
+    <a:lvl2pPr marL="457200" algn="l" defTabSz="914400" rtl="0" eaLnBrk="1" latinLnBrk="0" hangingPunct="1">
+      <a:defRPr sz="1200" kern="1200">
+        <a:solidFill>
+          <a:schemeClr val="tx1"/>
+        </a:solidFill>
+        <a:latin typeface="+mn-lt"/>
+        <a:ea typeface="+mn-ea"/>
+        <a:cs typeface="+mn-cs"/>
+      </a:defRPr>
+    </a:lvl2pPr>
+    <a:lvl3pPr marL="914400" algn="l" defTabSz="914400" rtl="0" eaLnBrk="1" latinLnBrk="0" hangingPunct="1">
+      <a:defRPr sz="1200" kern="1200">
+        <a:solidFill>
+          <a:schemeClr val="tx1"/>
+        </a:solidFill>
+        <a:latin typeface="+mn-lt"/>
+        <a:ea typeface="+mn-ea"/>
+        <a:cs typeface="+mn-cs"/>
+      </a:defRPr>
+    </a:lvl3pPr>
+    <a:lvl4pPr marL="1371600" algn="l" defTabSz="914400" rtl="0" eaLnBrk="1" latinLnBrk="0" hangingPunct="1">
+      <a:defRPr sz="1200" kern="1200">
+        <a:solidFill>
+          <a:schemeClr val="tx1"/>
+        </a:solidFill>
+        <a:latin typeface="+mn-lt"/>
+        <a:ea typeface="+mn-ea"/>
+        <a:cs typeface="+mn-cs"/>
+      </a:defRPr>
+    </a:lvl4pPr>
+    <a:lvl5pPr marL="1828800" algn="l" defTabSz="914400" rtl="0" eaLnBrk="1" latinLnBrk="0" hangingPunct="1">
+      <a:defRPr sz="1200" kern="1200">
+        <a:solidFill>
+          <a:schemeClr val="tx1"/>
+        </a:solidFill>
+        <a:latin typeface="+mn-lt"/>
+        <a:ea typeface="+mn-ea"/>
+        <a:cs typeface="+mn-cs"/>
+      </a:defRPr>
+    </a:lvl5pPr>
+    <a:lvl6pPr marL="2286000" algn="l" defTabSz="914400" rtl="0" eaLnBrk="1" latinLnBrk="0" hangingPunct="1">
+      <a:defRPr sz="1200" kern="1200">
+        <a:solidFill>
+          <a:schemeClr val="tx1"/>
+        </a:solidFill>
+        <a:latin typeface="+mn-lt"/>
+        <a:ea typeface="+mn-ea"/>
+        <a:cs typeface="+mn-cs"/>
+      </a:defRPr>
+    </a:lvl6pPr>
+    <a:lvl7pPr marL="2743200" algn="l" defTabSz="914400" rtl="0" eaLnBrk="1" latinLnBrk="0" hangingPunct="1">
+      <a:defRPr sz="1200" kern="1200">
+        <a:solidFill>
+          <a:schemeClr val="tx1"/>
+        </a:solidFill>
+        <a:latin typeface="+mn-lt"/>
+        <a:ea typeface="+mn-ea"/>
+        <a:cs typeface="+mn-cs"/>
+      </a:defRPr>
+    </a:lvl7pPr>
+    <a:lvl8pPr marL="3200400" algn="l" defTabSz="914400" rtl="0" eaLnBrk="1" latinLnBrk="0" hangingPunct="1">
+      <a:defRPr sz="1200" kern="1200">
+        <a:solidFill>
+          <a:schemeClr val="tx1"/>
+        </a:solidFill>
+        <a:latin typeface="+mn-lt"/>
+        <a:ea typeface="+mn-ea"/>
+        <a:cs typeface="+mn-cs"/>
+      </a:defRPr>
+    </a:lvl8pPr>
+    <a:lvl9pPr marL="3657600" algn="l" defTabSz="914400" rtl="0" eaLnBrk="1" latinLnBrk="0" hangingPunct="1">
+      <a:defRPr sz="1200" kern="1200">
+        <a:solidFill>
+          <a:schemeClr val="tx1"/>
+        </a:solidFill>
+        <a:latin typeface="+mn-lt"/>
+        <a:ea typeface="+mn-ea"/>
+        <a:cs typeface="+mn-cs"/>
+      </a:defRPr>
+    </a:lvl9pPr>
+  </p:notesStyle>
+</p:notesMaster>
+</file>
+
+<file path=ppt/notesSlides/notesSlide1.xml><?xml version="1.0" encoding="utf-8"?>
+<p:notes xmlns:a="http://schemas.openxmlformats.org/drawingml/2006/main" xmlns:r="http://schemas.openxmlformats.org/officeDocument/2006/relationships" xmlns:p="http://schemas.openxmlformats.org/presentationml/2006/main">
+  <p:cSld>
+    <p:spTree>
+      <p:nvGrpSpPr>
+        <p:cNvPr id="1" name=""/>
+        <p:cNvGrpSpPr/>
+        <p:nvPr/>
+      </p:nvGrpSpPr>
+      <p:grpSpPr>
+        <a:xfrm>
+          <a:off x="0" y="0"/>
+          <a:ext cx="0" cy="0"/>
+          <a:chOff x="0" y="0"/>
+          <a:chExt cx="0" cy="0"/>
+        </a:xfrm>
+      </p:grpSpPr>
+      <p:sp>
+        <p:nvSpPr>
+          <p:cNvPr id="2" name="Slide Image Placeholder 1"/>
+          <p:cNvSpPr>
+            <a:spLocks noGrp="1" noRot="1" noChangeAspect="1"/>
+          </p:cNvSpPr>
+          <p:nvPr>
+            <p:ph type="sldImg"/>
+          </p:nvPr>
+        </p:nvSpPr>
+        <p:spPr/>
+      </p:sp>
+      <p:sp>
+        <p:nvSpPr>
+          <p:cNvPr id="3" name="Notes Placeholder 2"/>
+          <p:cNvSpPr>
+            <a:spLocks noGrp="1"/>
+          </p:cNvSpPr>
+          <p:nvPr>
+            <p:ph type="body" idx="1"/>
+          </p:nvPr>
+        </p:nvSpPr>
+        <p:spPr/>
+        <p:txBody>
+          <a:bodyPr/>
+          <a:lstStyle/>
+          <a:p>
+            <a:endParaRPr lang="en-US" dirty="0"/>
+          </a:p>
+        </p:txBody>
+      </p:sp>
+      <p:sp>
+        <p:nvSpPr>
+          <p:cNvPr id="4" name="Slide Number Placeholder 3"/>
+          <p:cNvSpPr>
+            <a:spLocks noGrp="1"/>
+          </p:cNvSpPr>
+          <p:nvPr>
+            <p:ph type="sldNum" sz="quarter" idx="10"/>
+          </p:nvPr>
+        </p:nvSpPr>
+        <p:spPr/>
+        <p:txBody>
+          <a:bodyPr/>
+          <a:lstStyle/>
+          <a:p>
+            <a:fld id="{D1E1CCD8-C8BF-4840-9295-22A135C012D6}" type="slidenum">
+              <a:rPr lang="en-US" smtClean="0"/>
+              <a:t>6</a:t>
+            </a:fld>
+            <a:endParaRPr lang="en-US"/>
+          </a:p>
+        </p:txBody>
+      </p:sp>
+    </p:spTree>
+    <p:extLst>
+      <p:ext uri="{BB962C8B-B14F-4D97-AF65-F5344CB8AC3E}">
+        <p14:creationId xmlns:p14="http://schemas.microsoft.com/office/powerpoint/2010/main" val="1526592681"/>
+      </p:ext>
+    </p:extLst>
+  </p:cSld>
+  <p:clrMapOvr>
+    <a:masterClrMapping/>
+  </p:clrMapOvr>
+</p:notes>
 </file>
 
 <file path=ppt/slideLayouts/slideLayout1.xml><?xml version="1.0" encoding="utf-8"?>
@@ -3312,7 +3751,7 @@
           <a:p>
             <a:r>
               <a:rPr lang="en-US" sz="4000" dirty="0" smtClean="0"/>
-              <a:t>Random Partitions (if applicable)</a:t>
+              <a:t>Results</a:t>
             </a:r>
             <a:endParaRPr lang="en-US" sz="4000" dirty="0"/>
           </a:p>
@@ -3333,14 +3772,84 @@
           <a:bodyPr/>
           <a:lstStyle/>
           <a:p>
-            <a:endParaRPr lang="en-US"/>
-          </a:p>
-        </p:txBody>
-      </p:sp>
+            <a:r>
+              <a:rPr lang="en-US" dirty="0" smtClean="0"/>
+              <a:t>Converges faster than Simple PageRank</a:t>
+            </a:r>
+          </a:p>
+          <a:p>
+            <a:endParaRPr lang="en-US" dirty="0" smtClean="0"/>
+          </a:p>
+        </p:txBody>
+      </p:sp>
+      <p:pic>
+        <p:nvPicPr>
+          <p:cNvPr id="6146" name="Picture 2"/>
+          <p:cNvPicPr>
+            <a:picLocks noChangeAspect="1" noChangeArrowheads="1"/>
+          </p:cNvPicPr>
+          <p:nvPr/>
+        </p:nvPicPr>
+        <p:blipFill>
+          <a:blip r:embed="rId2">
+            <a:extLst>
+              <a:ext uri="{28A0092B-C50C-407E-A947-70E740481C1C}">
+                <a14:useLocalDpi xmlns:a14="http://schemas.microsoft.com/office/drawing/2010/main" val="0"/>
+              </a:ext>
+            </a:extLst>
+          </a:blip>
+          <a:srcRect/>
+          <a:stretch>
+            <a:fillRect/>
+          </a:stretch>
+        </p:blipFill>
+        <p:spPr bwMode="auto">
+          <a:xfrm>
+            <a:off x="1270000" y="2286000"/>
+            <a:ext cx="6096000" cy="4024313"/>
+          </a:xfrm>
+          <a:prstGeom prst="rect">
+            <a:avLst/>
+          </a:prstGeom>
+          <a:noFill/>
+          <a:ln>
+            <a:noFill/>
+          </a:ln>
+          <a:effectLst/>
+          <a:extLst>
+            <a:ext uri="{909E8E84-426E-40DD-AFC4-6F175D3DCCD1}">
+              <a14:hiddenFill xmlns:a14="http://schemas.microsoft.com/office/drawing/2010/main">
+                <a:solidFill>
+                  <a:schemeClr val="accent1"/>
+                </a:solidFill>
+              </a14:hiddenFill>
+            </a:ext>
+            <a:ext uri="{91240B29-F687-4F45-9708-019B960494DF}">
+              <a14:hiddenLine xmlns:a14="http://schemas.microsoft.com/office/drawing/2010/main" w="9525">
+                <a:solidFill>
+                  <a:schemeClr val="tx1"/>
+                </a:solidFill>
+                <a:miter lim="800000"/>
+                <a:headEnd/>
+                <a:tailEnd/>
+              </a14:hiddenLine>
+            </a:ext>
+            <a:ext uri="{AF507438-7753-43E0-B8FC-AC1667EBCBE1}">
+              <a14:hiddenEffects xmlns:a14="http://schemas.microsoft.com/office/drawing/2010/main">
+                <a:effectLst>
+                  <a:outerShdw dist="35921" dir="2700000" algn="ctr" rotWithShape="0">
+                    <a:schemeClr val="bg2"/>
+                  </a:outerShdw>
+                </a:effectLst>
+              </a14:hiddenEffects>
+            </a:ext>
+          </a:extLst>
+        </p:spPr>
+      </p:pic>
     </p:spTree>
     <p:extLst>
       <p:ext uri="{BB962C8B-B14F-4D97-AF65-F5344CB8AC3E}">
-        <p14:creationId xmlns:p14="http://schemas.microsoft.com/office/powerpoint/2010/main" val="1948988236"/>
+        <p14:creationId xmlns:p14="http://schemas.microsoft.com/office/powerpoint/2010/main" val="3902977825"/>
       </p:ext>
     </p:extLst>
   </p:cSld>
@@ -3391,6 +3900,207 @@
           <a:p>
             <a:r>
               <a:rPr lang="en-US" sz="4000" dirty="0" smtClean="0"/>
+              <a:t>Random Partitions</a:t>
+            </a:r>
+            <a:endParaRPr lang="en-US" sz="4000" dirty="0"/>
+          </a:p>
+        </p:txBody>
+      </p:sp>
+      <p:sp>
+        <p:nvSpPr>
+          <p:cNvPr id="3" name="Content Placeholder 2"/>
+          <p:cNvSpPr>
+            <a:spLocks noGrp="1"/>
+          </p:cNvSpPr>
+          <p:nvPr>
+            <p:ph idx="1"/>
+          </p:nvPr>
+        </p:nvSpPr>
+        <p:spPr/>
+        <p:txBody>
+          <a:bodyPr/>
+          <a:lstStyle/>
+          <a:p>
+            <a:r>
+              <a:rPr lang="en-US" dirty="0" smtClean="0"/>
+              <a:t>The performance of Blocked PageRank depends heavily on how the nodes are partitioned. </a:t>
+            </a:r>
+          </a:p>
+          <a:p>
+            <a:r>
+              <a:rPr lang="en-US" dirty="0" smtClean="0"/>
+              <a:t>Good partitions in Blocked PageRank converge much faster than Simple PageRank.</a:t>
+            </a:r>
+          </a:p>
+          <a:p>
+            <a:r>
+              <a:rPr lang="en-US" dirty="0" smtClean="0"/>
+              <a:t>But bad partitions in Blocked PageRank offers almost no improvement on Simple PageRank.</a:t>
+            </a:r>
+          </a:p>
+          <a:p>
+            <a:endParaRPr lang="en-US" dirty="0"/>
+          </a:p>
+          <a:p>
+            <a:r>
+              <a:rPr lang="en-US" dirty="0" smtClean="0"/>
+              <a:t>To partition our nodes into random blocks, we hash node numbers accordingly:</a:t>
+            </a:r>
+          </a:p>
+          <a:p>
+            <a:pPr lvl="1"/>
+            <a:r>
+              <a:rPr lang="en-US" dirty="0" smtClean="0"/>
+              <a:t>Block# = (Node# * 13) mod 68, where 68 = # of blocks.</a:t>
+            </a:r>
+          </a:p>
+        </p:txBody>
+      </p:sp>
+    </p:spTree>
+    <p:extLst>
+      <p:ext uri="{BB962C8B-B14F-4D97-AF65-F5344CB8AC3E}">
+        <p14:creationId xmlns:p14="http://schemas.microsoft.com/office/powerpoint/2010/main" val="1948988236"/>
+      </p:ext>
+    </p:extLst>
+  </p:cSld>
+  <p:clrMapOvr>
+    <a:masterClrMapping/>
+  </p:clrMapOvr>
+  <p:timing>
+    <p:tnLst>
+      <p:par>
+        <p:cTn id="1" dur="indefinite" restart="never" nodeType="tmRoot"/>
+      </p:par>
+    </p:tnLst>
+  </p:timing>
+</p:sld>
+</file>
+
+<file path=ppt/slides/slide12.xml><?xml version="1.0" encoding="utf-8"?>
+<p:sld xmlns:a="http://schemas.openxmlformats.org/drawingml/2006/main" xmlns:r="http://schemas.openxmlformats.org/officeDocument/2006/relationships" xmlns:p="http://schemas.openxmlformats.org/presentationml/2006/main">
+  <p:cSld>
+    <p:spTree>
+      <p:nvGrpSpPr>
+        <p:cNvPr id="1" name=""/>
+        <p:cNvGrpSpPr/>
+        <p:nvPr/>
+      </p:nvGrpSpPr>
+      <p:grpSpPr>
+        <a:xfrm>
+          <a:off x="0" y="0"/>
+          <a:ext cx="0" cy="0"/>
+          <a:chOff x="0" y="0"/>
+          <a:chExt cx="0" cy="0"/>
+        </a:xfrm>
+      </p:grpSpPr>
+      <p:sp>
+        <p:nvSpPr>
+          <p:cNvPr id="2" name="Title 1"/>
+          <p:cNvSpPr>
+            <a:spLocks noGrp="1"/>
+          </p:cNvSpPr>
+          <p:nvPr>
+            <p:ph type="title"/>
+          </p:nvPr>
+        </p:nvSpPr>
+        <p:spPr/>
+        <p:txBody>
+          <a:bodyPr/>
+          <a:lstStyle/>
+          <a:p>
+            <a:r>
+              <a:rPr lang="en-US" sz="4000" dirty="0" smtClean="0"/>
+              <a:t>Results</a:t>
+            </a:r>
+            <a:endParaRPr lang="en-US" sz="4000" dirty="0"/>
+          </a:p>
+        </p:txBody>
+      </p:sp>
+      <p:sp>
+        <p:nvSpPr>
+          <p:cNvPr id="3" name="Content Placeholder 2"/>
+          <p:cNvSpPr>
+            <a:spLocks noGrp="1"/>
+          </p:cNvSpPr>
+          <p:nvPr>
+            <p:ph idx="1"/>
+          </p:nvPr>
+        </p:nvSpPr>
+        <p:spPr/>
+        <p:txBody>
+          <a:bodyPr/>
+          <a:lstStyle/>
+          <a:p>
+            <a:r>
+              <a:rPr lang="en-US" dirty="0" smtClean="0"/>
+              <a:t>Slow convergence</a:t>
+            </a:r>
+          </a:p>
+          <a:p>
+            <a:r>
+              <a:rPr lang="en-US" dirty="0" smtClean="0"/>
+              <a:t>[graph]</a:t>
+            </a:r>
+          </a:p>
+          <a:p>
+            <a:endParaRPr lang="en-US" dirty="0"/>
+          </a:p>
+        </p:txBody>
+      </p:sp>
+    </p:spTree>
+    <p:extLst>
+      <p:ext uri="{BB962C8B-B14F-4D97-AF65-F5344CB8AC3E}">
+        <p14:creationId xmlns:p14="http://schemas.microsoft.com/office/powerpoint/2010/main" val="1347842439"/>
+      </p:ext>
+    </p:extLst>
+  </p:cSld>
+  <p:clrMapOvr>
+    <a:masterClrMapping/>
+  </p:clrMapOvr>
+  <p:timing>
+    <p:tnLst>
+      <p:par>
+        <p:cTn id="1" dur="indefinite" restart="never" nodeType="tmRoot"/>
+      </p:par>
+    </p:tnLst>
+  </p:timing>
+</p:sld>
+</file>
+
+<file path=ppt/slides/slide13.xml><?xml version="1.0" encoding="utf-8"?>
+<p:sld xmlns:a="http://schemas.openxmlformats.org/drawingml/2006/main" xmlns:r="http://schemas.openxmlformats.org/officeDocument/2006/relationships" xmlns:p="http://schemas.openxmlformats.org/presentationml/2006/main">
+  <p:cSld>
+    <p:spTree>
+      <p:nvGrpSpPr>
+        <p:cNvPr id="1" name=""/>
+        <p:cNvGrpSpPr/>
+        <p:nvPr/>
+      </p:nvGrpSpPr>
+      <p:grpSpPr>
+        <a:xfrm>
+          <a:off x="0" y="0"/>
+          <a:ext cx="0" cy="0"/>
+          <a:chOff x="0" y="0"/>
+          <a:chExt cx="0" cy="0"/>
+        </a:xfrm>
+      </p:grpSpPr>
+      <p:sp>
+        <p:nvSpPr>
+          <p:cNvPr id="2" name="Title 1"/>
+          <p:cNvSpPr>
+            <a:spLocks noGrp="1"/>
+          </p:cNvSpPr>
+          <p:nvPr>
+            <p:ph type="title"/>
+          </p:nvPr>
+        </p:nvSpPr>
+        <p:spPr/>
+        <p:txBody>
+          <a:bodyPr/>
+          <a:lstStyle/>
+          <a:p>
+            <a:r>
+              <a:rPr lang="en-US" sz="4000" dirty="0" smtClean="0"/>
               <a:t>Conclusion</a:t>
             </a:r>
             <a:endParaRPr lang="en-US" sz="4000" dirty="0"/>
@@ -3414,14 +4124,19 @@
           <a:p>
             <a:r>
               <a:rPr lang="en-US" dirty="0" smtClean="0"/>
-              <a:t>Blocked &gt; node-by-node</a:t>
-            </a:r>
-          </a:p>
-          <a:p>
+              <a:t>Blocked PageRank converges faster than Simple PageRank</a:t>
+            </a:r>
+          </a:p>
+          <a:p>
+            <a:pPr lvl="1"/>
             <a:r>
               <a:rPr lang="en-US" dirty="0" smtClean="0"/>
-              <a:t>Difficult to achieve good partitions in the blocked approach</a:t>
-            </a:r>
+              <a:t>This is only true when the nodes are in good partitions. In general, it’s difficult to achieve good partitions.</a:t>
+            </a:r>
+          </a:p>
+          <a:p>
+            <a:pPr lvl="1"/>
+            <a:endParaRPr lang="en-US" dirty="0" smtClean="0"/>
           </a:p>
           <a:p>
             <a:endParaRPr lang="en-US" dirty="0"/>
@@ -3531,7 +4246,11 @@
           <a:p>
             <a:r>
               <a:rPr lang="en-US" dirty="0"/>
-              <a:t>This is achieved primarily by overwriting the map and reduce methods in Apache's </a:t>
+              <a:t>This is achieved primarily by overwriting the map and reduce methods in </a:t>
+            </a:r>
+            <a:r>
+              <a:rPr lang="en-US" dirty="0" smtClean="0"/>
+              <a:t>Apache's </a:t>
             </a:r>
             <a:r>
               <a:rPr lang="en-US" dirty="0" err="1"/>
@@ -3541,9 +4260,77 @@
               <a:rPr lang="en-US" dirty="0"/>
               <a:t> libraries. </a:t>
             </a:r>
-          </a:p>
-        </p:txBody>
-      </p:sp>
+            <a:endParaRPr lang="en-US" dirty="0" smtClean="0"/>
+          </a:p>
+          <a:p>
+            <a:endParaRPr lang="en-US" dirty="0"/>
+          </a:p>
+        </p:txBody>
+      </p:sp>
+      <p:pic>
+        <p:nvPicPr>
+          <p:cNvPr id="1026" name="Picture 2"/>
+          <p:cNvPicPr>
+            <a:picLocks noChangeAspect="1" noChangeArrowheads="1"/>
+          </p:cNvPicPr>
+          <p:nvPr/>
+        </p:nvPicPr>
+        <p:blipFill>
+          <a:blip r:embed="rId2">
+            <a:extLst>
+              <a:ext uri="{28A0092B-C50C-407E-A947-70E740481C1C}">
+                <a14:useLocalDpi xmlns:a14="http://schemas.microsoft.com/office/drawing/2010/main" val="0"/>
+              </a:ext>
+            </a:extLst>
+          </a:blip>
+          <a:srcRect/>
+          <a:stretch>
+            <a:fillRect/>
+          </a:stretch>
+        </p:blipFill>
+        <p:spPr bwMode="auto">
+          <a:xfrm>
+            <a:off x="2667000" y="4248150"/>
+            <a:ext cx="3048000" cy="933450"/>
+          </a:xfrm>
+          <a:prstGeom prst="rect">
+            <a:avLst/>
+          </a:prstGeom>
+          <a:noFill/>
+          <a:ln>
+            <a:noFill/>
+          </a:ln>
+          <a:effectLst/>
+          <a:extLst>
+            <a:ext uri="{909E8E84-426E-40DD-AFC4-6F175D3DCCD1}">
+              <a14:hiddenFill xmlns:a14="http://schemas.microsoft.com/office/drawing/2010/main">
+                <a:solidFill>
+                  <a:schemeClr val="accent1"/>
+                </a:solidFill>
+              </a14:hiddenFill>
+            </a:ext>
+            <a:ext uri="{91240B29-F687-4F45-9708-019B960494DF}">
+              <a14:hiddenLine xmlns:a14="http://schemas.microsoft.com/office/drawing/2010/main" w="9525">
+                <a:solidFill>
+                  <a:schemeClr val="tx1"/>
+                </a:solidFill>
+                <a:miter lim="800000"/>
+                <a:headEnd/>
+                <a:tailEnd/>
+              </a14:hiddenLine>
+            </a:ext>
+            <a:ext uri="{AF507438-7753-43E0-B8FC-AC1667EBCBE1}">
+              <a14:hiddenEffects xmlns:a14="http://schemas.microsoft.com/office/drawing/2010/main">
+                <a:effectLst>
+                  <a:outerShdw dist="35921" dir="2700000" algn="ctr" rotWithShape="0">
+                    <a:schemeClr val="bg2"/>
+                  </a:outerShdw>
+                </a:effectLst>
+              </a14:hiddenEffects>
+            </a:ext>
+          </a:extLst>
+        </p:spPr>
+      </p:pic>
     </p:spTree>
     <p:extLst>
       <p:ext uri="{BB962C8B-B14F-4D97-AF65-F5344CB8AC3E}">
@@ -3614,14 +4401,35 @@
             <p:ph idx="1"/>
           </p:nvPr>
         </p:nvSpPr>
-        <p:spPr/>
+        <p:spPr>
+          <a:xfrm>
+            <a:off x="457200" y="1371600"/>
+            <a:ext cx="7620000" cy="4800600"/>
+          </a:xfrm>
+        </p:spPr>
         <p:txBody>
           <a:bodyPr/>
           <a:lstStyle/>
           <a:p>
             <a:r>
               <a:rPr lang="en-US" dirty="0"/>
-              <a:t>There are two different approaches we take: simple PageRank and blocked PageRank.</a:t>
+              <a:t>There are two different approaches we take: </a:t>
+            </a:r>
+            <a:r>
+              <a:rPr lang="en-US" dirty="0" smtClean="0"/>
+              <a:t>Simple </a:t>
+            </a:r>
+            <a:r>
+              <a:rPr lang="en-US" dirty="0"/>
+              <a:t>PageRank and B</a:t>
+            </a:r>
+            <a:r>
+              <a:rPr lang="en-US" dirty="0" smtClean="0"/>
+              <a:t>locked </a:t>
+            </a:r>
+            <a:r>
+              <a:rPr lang="en-US" dirty="0"/>
+              <a:t>PageRank.</a:t>
             </a:r>
           </a:p>
           <a:p>
@@ -3646,6 +4454,70 @@
           </a:p>
         </p:txBody>
       </p:sp>
+      <p:pic>
+        <p:nvPicPr>
+          <p:cNvPr id="4" name="Picture 5"/>
+          <p:cNvPicPr>
+            <a:picLocks noChangeAspect="1" noChangeArrowheads="1"/>
+          </p:cNvPicPr>
+          <p:nvPr/>
+        </p:nvPicPr>
+        <p:blipFill>
+          <a:blip r:embed="rId2" cstate="print">
+            <a:extLst>
+              <a:ext uri="{28A0092B-C50C-407E-A947-70E740481C1C}">
+                <a14:useLocalDpi xmlns:a14="http://schemas.microsoft.com/office/drawing/2010/main" val="0"/>
+              </a:ext>
+            </a:extLst>
+          </a:blip>
+          <a:srcRect/>
+          <a:stretch>
+            <a:fillRect/>
+          </a:stretch>
+        </p:blipFill>
+        <p:spPr bwMode="auto">
+          <a:xfrm>
+            <a:off x="2438400" y="3886200"/>
+            <a:ext cx="3505200" cy="2577404"/>
+          </a:xfrm>
+          <a:prstGeom prst="rect">
+            <a:avLst/>
+          </a:prstGeom>
+          <a:noFill/>
+          <a:ln>
+            <a:noFill/>
+          </a:ln>
+          <a:effectLst/>
+          <a:extLst>
+            <a:ext uri="{909E8E84-426E-40DD-AFC4-6F175D3DCCD1}">
+              <a14:hiddenFill xmlns:a14="http://schemas.microsoft.com/office/drawing/2010/main">
+                <a:solidFill>
+                  <a:schemeClr val="accent1"/>
+                </a:solidFill>
+              </a14:hiddenFill>
+            </a:ext>
+            <a:ext uri="{91240B29-F687-4F45-9708-019B960494DF}">
+              <a14:hiddenLine xmlns:a14="http://schemas.microsoft.com/office/drawing/2010/main" w="9525">
+                <a:solidFill>
+                  <a:schemeClr val="tx1"/>
+                </a:solidFill>
+                <a:miter lim="800000"/>
+                <a:headEnd/>
+                <a:tailEnd/>
+              </a14:hiddenLine>
+            </a:ext>
+            <a:ext uri="{AF507438-7753-43E0-B8FC-AC1667EBCBE1}">
+              <a14:hiddenEffects xmlns:a14="http://schemas.microsoft.com/office/drawing/2010/main">
+                <a:effectLst>
+                  <a:outerShdw dist="35921" dir="2700000" algn="ctr" rotWithShape="0">
+                    <a:schemeClr val="bg2"/>
+                  </a:outerShdw>
+                </a:effectLst>
+              </a14:hiddenEffects>
+            </a:ext>
+          </a:extLst>
+        </p:spPr>
+      </p:pic>
     </p:spTree>
     <p:extLst>
       <p:ext uri="{BB962C8B-B14F-4D97-AF65-F5344CB8AC3E}">
@@ -3723,10 +4595,19 @@
           <a:p>
             <a:r>
               <a:rPr lang="en-US" dirty="0"/>
-              <a:t>We'll start with simple PageRank, which is a node-by-node approach.</a:t>
-            </a:r>
-          </a:p>
-          <a:p>
+              <a:t>We'll start with </a:t>
+            </a:r>
+            <a:r>
+              <a:rPr lang="en-US" dirty="0" smtClean="0"/>
+              <a:t>Simple </a:t>
+            </a:r>
+            <a:r>
+              <a:rPr lang="en-US" dirty="0"/>
+              <a:t>PageRank, which is a node-by-node approach.</a:t>
+            </a:r>
+          </a:p>
+          <a:p>
+            <a:pPr lvl="1"/>
             <a:r>
               <a:rPr lang="en-US" dirty="0"/>
               <a:t>In other words, single nodes are passed through </a:t>
@@ -3745,40 +4626,138 @@
             </a:r>
             <a:r>
               <a:rPr lang="en-US" dirty="0"/>
-              <a:t> are calculated individually for each node.</a:t>
-            </a:r>
+              <a:t> are calculated </a:t>
+            </a:r>
+            <a:r>
+              <a:rPr lang="en-US" dirty="0" smtClean="0"/>
+              <a:t>individually, node by node.</a:t>
+            </a:r>
+            <a:endParaRPr lang="en-US" dirty="0"/>
           </a:p>
           <a:p>
             <a:r>
               <a:rPr lang="en-US" dirty="0"/>
-              <a:t>To gauge how quickly (rather, how slowly) simple PageRank converges, we calculate the average of the residuals for each node for each phase.</a:t>
-            </a:r>
-          </a:p>
-          <a:p>
+              <a:t>To gauge how quickly (rather, how slowly) simple PageRank converges, we calculate the average of the residuals for each node for each </a:t>
+            </a:r>
+            <a:r>
+              <a:rPr lang="en-US" dirty="0" smtClean="0"/>
+              <a:t>phase. The residual is defined as:</a:t>
+            </a:r>
+          </a:p>
+          <a:p>
+            <a:endParaRPr lang="en-US" dirty="0" smtClean="0"/>
+          </a:p>
+          <a:p>
+            <a:pPr lvl="1"/>
+            <a:r>
+              <a:rPr lang="en-US" dirty="0" smtClean="0"/>
+              <a:t>The </a:t>
+            </a:r>
             <a:r>
               <a:rPr lang="en-US" dirty="0"/>
-              <a:t>The residual of a node is simply the normalized difference between the node's PageRank value from the previous phase and the current phase. </a:t>
-            </a:r>
-          </a:p>
-          <a:p>
+              <a:t>residual of a </a:t>
+            </a:r>
+            <a:r>
+              <a:rPr lang="en-US" dirty="0" smtClean="0"/>
+              <a:t>node u </a:t>
+            </a:r>
             <a:r>
               <a:rPr lang="en-US" dirty="0"/>
-              <a:t>To measure convergence, we see how quickly the average residual decreases through </a:t>
-            </a:r>
-            <a:r>
-              <a:rPr lang="en-US" dirty="0" err="1"/>
+              <a:t>is simply the normalized difference between the node's PageRank value from the previous phase and the current phase. </a:t>
+            </a:r>
+          </a:p>
+          <a:p>
+            <a:r>
+              <a:rPr lang="en-US" dirty="0" smtClean="0"/>
+              <a:t>As a measure of convergence, </a:t>
+            </a:r>
+            <a:r>
+              <a:rPr lang="en-US" dirty="0"/>
+              <a:t>we see how quickly the average residual decreases through </a:t>
+            </a:r>
+            <a:r>
+              <a:rPr lang="en-US" dirty="0" smtClean="0"/>
+              <a:t>phases of </a:t>
+            </a:r>
+            <a:r>
+              <a:rPr lang="en-US" dirty="0" err="1" smtClean="0"/>
               <a:t>MapReduce</a:t>
             </a:r>
             <a:r>
-              <a:rPr lang="en-US" dirty="0"/>
-              <a:t> phases.</a:t>
-            </a:r>
-          </a:p>
-          <a:p>
+              <a:rPr lang="en-US" dirty="0" smtClean="0"/>
+              <a:t>.</a:t>
+            </a:r>
             <a:endParaRPr lang="en-US" dirty="0"/>
           </a:p>
-        </p:txBody>
-      </p:sp>
+          <a:p>
+            <a:endParaRPr lang="en-US" dirty="0"/>
+          </a:p>
+        </p:txBody>
+      </p:sp>
+      <p:pic>
+        <p:nvPicPr>
+          <p:cNvPr id="3074" name="Picture 2"/>
+          <p:cNvPicPr>
+            <a:picLocks noChangeAspect="1" noChangeArrowheads="1"/>
+          </p:cNvPicPr>
+          <p:nvPr/>
+        </p:nvPicPr>
+        <p:blipFill>
+          <a:blip r:embed="rId2">
+            <a:extLst>
+              <a:ext uri="{28A0092B-C50C-407E-A947-70E740481C1C}">
+                <a14:useLocalDpi xmlns:a14="http://schemas.microsoft.com/office/drawing/2010/main" val="0"/>
+              </a:ext>
+            </a:extLst>
+          </a:blip>
+          <a:srcRect/>
+          <a:stretch>
+            <a:fillRect/>
+          </a:stretch>
+        </p:blipFill>
+        <p:spPr bwMode="auto">
+          <a:xfrm>
+            <a:off x="3048000" y="4095750"/>
+            <a:ext cx="2470897" cy="400050"/>
+          </a:xfrm>
+          <a:prstGeom prst="rect">
+            <a:avLst/>
+          </a:prstGeom>
+          <a:noFill/>
+          <a:ln>
+            <a:noFill/>
+          </a:ln>
+          <a:effectLst/>
+          <a:extLst>
+            <a:ext uri="{909E8E84-426E-40DD-AFC4-6F175D3DCCD1}">
+              <a14:hiddenFill xmlns:a14="http://schemas.microsoft.com/office/drawing/2010/main">
+                <a:solidFill>
+                  <a:schemeClr val="accent1"/>
+                </a:solidFill>
+              </a14:hiddenFill>
+            </a:ext>
+            <a:ext uri="{91240B29-F687-4F45-9708-019B960494DF}">
+              <a14:hiddenLine xmlns:a14="http://schemas.microsoft.com/office/drawing/2010/main" w="9525">
+                <a:solidFill>
+                  <a:schemeClr val="tx1"/>
+                </a:solidFill>
+                <a:miter lim="800000"/>
+                <a:headEnd/>
+                <a:tailEnd/>
+              </a14:hiddenLine>
+            </a:ext>
+            <a:ext uri="{AF507438-7753-43E0-B8FC-AC1667EBCBE1}">
+              <a14:hiddenEffects xmlns:a14="http://schemas.microsoft.com/office/drawing/2010/main">
+                <a:effectLst>
+                  <a:outerShdw dist="35921" dir="2700000" algn="ctr" rotWithShape="0">
+                    <a:schemeClr val="bg2"/>
+                  </a:outerShdw>
+                </a:effectLst>
+              </a14:hiddenEffects>
+            </a:ext>
+          </a:extLst>
+        </p:spPr>
+      </p:pic>
     </p:spTree>
     <p:extLst>
       <p:ext uri="{BB962C8B-B14F-4D97-AF65-F5344CB8AC3E}">
@@ -3849,26 +4828,49 @@
             <p:ph idx="1"/>
           </p:nvPr>
         </p:nvSpPr>
-        <p:spPr/>
+        <p:spPr>
+          <a:xfrm>
+            <a:off x="457200" y="1600200"/>
+            <a:ext cx="7620000" cy="4800600"/>
+          </a:xfrm>
+        </p:spPr>
         <p:txBody>
           <a:bodyPr>
-            <a:normAutofit fontScale="92500"/>
+            <a:normAutofit fontScale="92500" lnSpcReduction="10000"/>
           </a:bodyPr>
           <a:lstStyle/>
           <a:p>
             <a:r>
+              <a:rPr lang="en-US" dirty="0"/>
+              <a:t>M</a:t>
+            </a:r>
+            <a:r>
               <a:rPr lang="en-US" dirty="0" smtClean="0"/>
-              <a:t>mappers </a:t>
+              <a:t>appers and reducers </a:t>
             </a:r>
             <a:r>
               <a:rPr lang="en-US" dirty="0"/>
-              <a:t>and reducers both have input and output types Text key ; Text value</a:t>
-            </a:r>
-          </a:p>
-          <a:p>
+              <a:t>both have </a:t>
+            </a:r>
             <a:r>
               <a:rPr lang="en-US" dirty="0" smtClean="0"/>
-              <a:t>key </a:t>
+              <a:t>the following input/output </a:t>
+            </a:r>
+            <a:r>
+              <a:rPr lang="en-US" dirty="0"/>
+              <a:t>types </a:t>
+            </a:r>
+            <a:endParaRPr lang="en-US" dirty="0" smtClean="0"/>
+          </a:p>
+          <a:p>
+            <a:pPr lvl="1"/>
+            <a:r>
+              <a:rPr lang="en-US" dirty="0"/>
+              <a:t>K</a:t>
+            </a:r>
+            <a:r>
+              <a:rPr lang="en-US" dirty="0" smtClean="0"/>
+              <a:t>ey </a:t>
             </a:r>
             <a:r>
               <a:rPr lang="en-US" dirty="0"/>
@@ -3876,28 +4878,46 @@
             </a:r>
             <a:r>
               <a:rPr lang="en-US" dirty="0" smtClean="0"/>
-              <a:t>number</a:t>
-            </a:r>
-          </a:p>
-          <a:p>
+              <a:t>number of type Text</a:t>
+            </a:r>
+          </a:p>
+          <a:p>
+            <a:pPr lvl="1"/>
+            <a:r>
+              <a:rPr lang="en-US" dirty="0"/>
+              <a:t>V</a:t>
+            </a:r>
             <a:r>
               <a:rPr lang="en-US" dirty="0" smtClean="0"/>
-              <a:t>[include image of the value string and its parts]</a:t>
+              <a:t>alue </a:t>
+            </a:r>
+            <a:r>
+              <a:rPr lang="en-US" dirty="0"/>
+              <a:t>is a string </a:t>
+            </a:r>
+            <a:r>
+              <a:rPr lang="en-US" dirty="0" smtClean="0"/>
+              <a:t>(type Text) containing </a:t>
+            </a:r>
+            <a:r>
+              <a:rPr lang="en-US" dirty="0"/>
+              <a:t>the node's PageRank value and outgoing nodes, all delimited by </a:t>
+            </a:r>
+            <a:r>
+              <a:rPr lang="en-US" dirty="0" smtClean="0"/>
+              <a:t>"_“.</a:t>
             </a:r>
             <a:endParaRPr lang="en-US" dirty="0"/>
           </a:p>
           <a:p>
+            <a:pPr lvl="1"/>
+            <a:r>
+              <a:rPr lang="en-US" dirty="0"/>
+              <a:t>[include image of the value string and its parts</a:t>
+            </a:r>
             <a:r>
               <a:rPr lang="en-US" dirty="0" smtClean="0"/>
-              <a:t>value </a:t>
-            </a:r>
-            <a:r>
-              <a:rPr lang="en-US" dirty="0"/>
-              <a:t>is a string containing the node's PageRank value and outgoing nodes, all delimited by </a:t>
-            </a:r>
-            <a:r>
-              <a:rPr lang="en-US" dirty="0" smtClean="0"/>
-              <a:t>"_“</a:t>
+              <a:t>]</a:t>
             </a:r>
           </a:p>
           <a:p>
@@ -3913,8 +4933,8 @@
           <a:p>
             <a:pPr lvl="1"/>
             <a:r>
-              <a:rPr lang="en-US" dirty="0" err="1"/>
-              <a:t>todo</a:t>
+              <a:rPr lang="en-US" dirty="0" smtClean="0"/>
+              <a:t>[image of formats]</a:t>
             </a:r>
             <a:endParaRPr lang="en-US" dirty="0"/>
           </a:p>
@@ -3927,21 +4947,45 @@
           <a:p>
             <a:pPr lvl="1"/>
             <a:r>
-              <a:rPr lang="en-US" dirty="0" err="1" smtClean="0"/>
-              <a:t>Todo</a:t>
-            </a:r>
-            <a:endParaRPr lang="en-US" dirty="0"/>
-          </a:p>
-          <a:p>
+              <a:rPr lang="en-US" dirty="0"/>
+              <a:t>[image of formats]</a:t>
+            </a:r>
+          </a:p>
+          <a:p>
+            <a:r>
+              <a:rPr lang="en-US" dirty="0"/>
+              <a:t>T</a:t>
+            </a:r>
             <a:r>
               <a:rPr lang="en-US" dirty="0" smtClean="0"/>
-              <a:t>so </a:t>
+              <a:t>o </a:t>
             </a:r>
             <a:r>
               <a:rPr lang="en-US" dirty="0"/>
-              <a:t>to pass values between mappers and reducers, we parse the PageRank and outgoing nodes out of the value field. </a:t>
-            </a:r>
-            <a:endParaRPr lang="en-US" dirty="0" smtClean="0"/>
+              <a:t>pass values between mappers and reducers, we </a:t>
+            </a:r>
+            <a:r>
+              <a:rPr lang="en-US" dirty="0" smtClean="0"/>
+              <a:t>construct a value string (the node’s PageRank </a:t>
+            </a:r>
+            <a:r>
+              <a:rPr lang="en-US" dirty="0"/>
+              <a:t>and outgoing </a:t>
+            </a:r>
+            <a:r>
+              <a:rPr lang="en-US" dirty="0" smtClean="0"/>
+              <a:t>nodes) when emitting.</a:t>
+            </a:r>
+          </a:p>
+          <a:p>
+            <a:r>
+              <a:rPr lang="en-US" dirty="0"/>
+              <a:t>W</a:t>
+            </a:r>
+            <a:r>
+              <a:rPr lang="en-US" dirty="0" smtClean="0"/>
+              <a:t>hen a mapper or reducer receives it, it can parse them out of the string.</a:t>
+            </a:r>
           </a:p>
           <a:p>
             <a:r>
@@ -4014,7 +5058,7 @@
           <a:p>
             <a:r>
               <a:rPr lang="en-US" sz="4000" dirty="0" smtClean="0"/>
-              <a:t>Results and Discussion</a:t>
+              <a:t>Results</a:t>
             </a:r>
             <a:endParaRPr lang="en-US" sz="4000" dirty="0"/>
           </a:p>
@@ -4030,33 +5074,108 @@
             <p:ph idx="1"/>
           </p:nvPr>
         </p:nvSpPr>
-        <p:spPr/>
-        <p:txBody>
-          <a:bodyPr/>
-          <a:lstStyle/>
-          <a:p>
-            <a:r>
-              <a:rPr lang="en-US" dirty="0" err="1" smtClean="0"/>
-              <a:t>avg</a:t>
-            </a:r>
+        <p:spPr>
+          <a:xfrm>
+            <a:off x="457200" y="1447800"/>
+            <a:ext cx="7620000" cy="4800600"/>
+          </a:xfrm>
+        </p:spPr>
+        <p:txBody>
+          <a:bodyPr/>
+          <a:lstStyle/>
+          <a:p>
             <a:r>
               <a:rPr lang="en-US" dirty="0" smtClean="0"/>
-              <a:t> </a:t>
+              <a:t>Average </a:t>
             </a:r>
             <a:r>
               <a:rPr lang="en-US" dirty="0"/>
-              <a:t>residual decreases slowly -&gt; slow convergence</a:t>
-            </a:r>
-          </a:p>
-          <a:p>
+              <a:t>residual decreases slowly -&gt; slow </a:t>
+            </a:r>
             <a:r>
               <a:rPr lang="en-US" dirty="0" smtClean="0"/>
-              <a:t>[include graph]</a:t>
+              <a:t>convergence</a:t>
+            </a:r>
+          </a:p>
+          <a:p>
+            <a:r>
+              <a:rPr lang="en-US" dirty="0" smtClean="0"/>
+              <a:t>Does not converge to accurate values by 5 iterations</a:t>
             </a:r>
             <a:endParaRPr lang="en-US" dirty="0"/>
           </a:p>
-        </p:txBody>
-      </p:sp>
+          <a:p>
+            <a:pPr marL="114300" indent="0">
+              <a:buNone/>
+            </a:pPr>
+            <a:endParaRPr lang="en-US" dirty="0"/>
+          </a:p>
+        </p:txBody>
+      </p:sp>
+      <p:pic>
+        <p:nvPicPr>
+          <p:cNvPr id="5123" name="Picture 3"/>
+          <p:cNvPicPr>
+            <a:picLocks noChangeAspect="1" noChangeArrowheads="1"/>
+          </p:cNvPicPr>
+          <p:nvPr/>
+        </p:nvPicPr>
+        <p:blipFill>
+          <a:blip r:embed="rId3">
+            <a:extLst>
+              <a:ext uri="{28A0092B-C50C-407E-A947-70E740481C1C}">
+                <a14:useLocalDpi xmlns:a14="http://schemas.microsoft.com/office/drawing/2010/main" val="0"/>
+              </a:ext>
+            </a:extLst>
+          </a:blip>
+          <a:srcRect/>
+          <a:stretch>
+            <a:fillRect/>
+          </a:stretch>
+        </p:blipFill>
+        <p:spPr bwMode="auto">
+          <a:xfrm>
+            <a:off x="1447800" y="2514600"/>
+            <a:ext cx="5529263" cy="3786187"/>
+          </a:xfrm>
+          <a:prstGeom prst="rect">
+            <a:avLst/>
+          </a:prstGeom>
+          <a:noFill/>
+          <a:ln>
+            <a:noFill/>
+          </a:ln>
+          <a:effectLst/>
+          <a:extLst>
+            <a:ext uri="{909E8E84-426E-40DD-AFC4-6F175D3DCCD1}">
+              <a14:hiddenFill xmlns:a14="http://schemas.microsoft.com/office/drawing/2010/main">
+                <a:solidFill>
+                  <a:schemeClr val="accent1"/>
+                </a:solidFill>
+              </a14:hiddenFill>
+            </a:ext>
+            <a:ext uri="{91240B29-F687-4F45-9708-019B960494DF}">
+              <a14:hiddenLine xmlns:a14="http://schemas.microsoft.com/office/drawing/2010/main" w="9525">
+                <a:solidFill>
+                  <a:schemeClr val="tx1"/>
+                </a:solidFill>
+                <a:miter lim="800000"/>
+                <a:headEnd/>
+                <a:tailEnd/>
+              </a14:hiddenLine>
+            </a:ext>
+            <a:ext uri="{AF507438-7753-43E0-B8FC-AC1667EBCBE1}">
+              <a14:hiddenEffects xmlns:a14="http://schemas.microsoft.com/office/drawing/2010/main">
+                <a:effectLst>
+                  <a:outerShdw dist="35921" dir="2700000" algn="ctr" rotWithShape="0">
+                    <a:schemeClr val="bg2"/>
+                  </a:outerShdw>
+                </a:effectLst>
+              </a14:hiddenEffects>
+            </a:ext>
+          </a:extLst>
+        </p:spPr>
+      </p:pic>
     </p:spTree>
     <p:extLst>
       <p:ext uri="{BB962C8B-B14F-4D97-AF65-F5344CB8AC3E}">
@@ -4127,7 +5246,12 @@
             <p:ph idx="1"/>
           </p:nvPr>
         </p:nvSpPr>
-        <p:spPr/>
+        <p:spPr>
+          <a:xfrm>
+            <a:off x="457200" y="1447800"/>
+            <a:ext cx="7620000" cy="4800600"/>
+          </a:xfrm>
+        </p:spPr>
         <p:txBody>
           <a:bodyPr/>
           <a:lstStyle/>
@@ -4139,35 +5263,121 @@
           </a:p>
           <a:p>
             <a:r>
+              <a:rPr lang="en-US" dirty="0" smtClean="0"/>
+              <a:t>The map function is </a:t>
+            </a:r>
+            <a:r>
               <a:rPr lang="en-US" dirty="0"/>
-              <a:t>Map is similar to simple w/ different input/outputs</a:t>
-            </a:r>
-          </a:p>
-          <a:p>
+              <a:t>similar to S</a:t>
+            </a:r>
+            <a:r>
+              <a:rPr lang="en-US" dirty="0" smtClean="0"/>
+              <a:t>imple PageRank with </a:t>
+            </a:r>
             <a:r>
               <a:rPr lang="en-US" dirty="0"/>
-              <a:t>Reduce performs multiple PageRank iterations for each block until the residual error falls below a threshold.</a:t>
-            </a:r>
-          </a:p>
-          <a:p>
+              <a:t>different </a:t>
+            </a:r>
+            <a:r>
+              <a:rPr lang="en-US" dirty="0" smtClean="0"/>
+              <a:t>input/output parameters.</a:t>
+            </a:r>
+            <a:endParaRPr lang="en-US" dirty="0"/>
+          </a:p>
+          <a:p>
+            <a:r>
+              <a:rPr lang="en-US" dirty="0" smtClean="0"/>
+              <a:t>The reduce function performs </a:t>
+            </a:r>
             <a:r>
               <a:rPr lang="en-US" dirty="0"/>
-              <a:t>After each </a:t>
-            </a:r>
-            <a:r>
-              <a:rPr lang="en-US" dirty="0" err="1"/>
-              <a:t>MapReduce</a:t>
+              <a:t>multiple PageRank iterations for </a:t>
+            </a:r>
+            <a:r>
+              <a:rPr lang="en-US" dirty="0" smtClean="0"/>
+              <a:t>a given block </a:t>
             </a:r>
             <a:r>
               <a:rPr lang="en-US" dirty="0"/>
-              <a:t> phase, sum all the residuals of each block and see if it falls below an error bound to check for convergence.</a:t>
-            </a:r>
-          </a:p>
-          <a:p>
+              <a:t>until the residual error falls below a threshold</a:t>
+            </a:r>
+            <a:r>
+              <a:rPr lang="en-US" dirty="0" smtClean="0"/>
+              <a:t>.</a:t>
+            </a:r>
+          </a:p>
+          <a:p>
+            <a:pPr marL="114300" indent="0">
+              <a:buNone/>
+            </a:pPr>
             <a:endParaRPr lang="en-US" dirty="0"/>
           </a:p>
         </p:txBody>
       </p:sp>
+      <p:pic>
+        <p:nvPicPr>
+          <p:cNvPr id="2050" name="Picture 2"/>
+          <p:cNvPicPr>
+            <a:picLocks noChangeAspect="1" noChangeArrowheads="1"/>
+          </p:cNvPicPr>
+          <p:nvPr/>
+        </p:nvPicPr>
+        <p:blipFill>
+          <a:blip r:embed="rId2">
+            <a:extLst>
+              <a:ext uri="{28A0092B-C50C-407E-A947-70E740481C1C}">
+                <a14:useLocalDpi xmlns:a14="http://schemas.microsoft.com/office/drawing/2010/main" val="0"/>
+              </a:ext>
+            </a:extLst>
+          </a:blip>
+          <a:srcRect/>
+          <a:stretch>
+            <a:fillRect/>
+          </a:stretch>
+        </p:blipFill>
+        <p:spPr bwMode="auto">
+          <a:xfrm>
+            <a:off x="2514600" y="3733800"/>
+            <a:ext cx="3505200" cy="2765372"/>
+          </a:xfrm>
+          <a:prstGeom prst="rect">
+            <a:avLst/>
+          </a:prstGeom>
+          <a:noFill/>
+          <a:ln>
+            <a:noFill/>
+          </a:ln>
+          <a:effectLst/>
+          <a:extLst>
+            <a:ext uri="{909E8E84-426E-40DD-AFC4-6F175D3DCCD1}">
+              <a14:hiddenFill xmlns:a14="http://schemas.microsoft.com/office/drawing/2010/main">
+                <a:solidFill>
+                  <a:schemeClr val="accent1"/>
+                </a:solidFill>
+              </a14:hiddenFill>
+            </a:ext>
+            <a:ext uri="{91240B29-F687-4F45-9708-019B960494DF}">
+              <a14:hiddenLine xmlns:a14="http://schemas.microsoft.com/office/drawing/2010/main" w="9525">
+                <a:solidFill>
+                  <a:schemeClr val="tx1"/>
+                </a:solidFill>
+                <a:miter lim="800000"/>
+                <a:headEnd/>
+                <a:tailEnd/>
+              </a14:hiddenLine>
+            </a:ext>
+            <a:ext uri="{AF507438-7753-43E0-B8FC-AC1667EBCBE1}">
+              <a14:hiddenEffects xmlns:a14="http://schemas.microsoft.com/office/drawing/2010/main">
+                <a:effectLst>
+                  <a:outerShdw dist="35921" dir="2700000" algn="ctr" rotWithShape="0">
+                    <a:schemeClr val="bg2"/>
+                  </a:outerShdw>
+                </a:effectLst>
+              </a14:hiddenEffects>
+            </a:ext>
+          </a:extLst>
+        </p:spPr>
+      </p:pic>
     </p:spTree>
     <p:extLst>
       <p:ext uri="{BB962C8B-B14F-4D97-AF65-F5344CB8AC3E}">
@@ -4222,7 +5432,7 @@
           <a:p>
             <a:r>
               <a:rPr lang="en-US" sz="4000" dirty="0" smtClean="0"/>
-              <a:t>Blocked PageRank Implementation</a:t>
+              <a:t>Blocked PageRank</a:t>
             </a:r>
             <a:endParaRPr lang="en-US" sz="4000" dirty="0"/>
           </a:p>
@@ -4241,119 +5451,132 @@
         <p:spPr/>
         <p:txBody>
           <a:bodyPr>
-            <a:normAutofit fontScale="92500"/>
+            <a:normAutofit/>
           </a:bodyPr>
           <a:lstStyle/>
           <a:p>
             <a:r>
               <a:rPr lang="en-US" dirty="0" smtClean="0"/>
-              <a:t>mappers </a:t>
-            </a:r>
-            <a:r>
-              <a:rPr lang="en-US" dirty="0"/>
-              <a:t>and reducers both have input and output types Text key ; Text value</a:t>
-            </a:r>
-          </a:p>
-          <a:p>
+              <a:t>The residual for Blocked PageRank is slightly different than that of Simple PageRank:</a:t>
+            </a:r>
+            <a:endParaRPr lang="en-US" dirty="0"/>
+          </a:p>
+          <a:p>
+            <a:endParaRPr lang="en-US" dirty="0" smtClean="0"/>
+          </a:p>
+          <a:p>
+            <a:pPr lvl="1"/>
             <a:r>
               <a:rPr lang="en-US" dirty="0" smtClean="0"/>
-              <a:t>key </a:t>
-            </a:r>
-            <a:r>
-              <a:rPr lang="en-US" dirty="0"/>
-              <a:t>is block </a:t>
-            </a:r>
+              <a:t>The residual of a node v is the normalized difference between the node's PageRank value from the first iteration and the last iteration of a reduce task. </a:t>
+            </a:r>
+          </a:p>
+          <a:p>
             <a:r>
               <a:rPr lang="en-US" dirty="0" smtClean="0"/>
-              <a:t>number</a:t>
-            </a:r>
-          </a:p>
-          <a:p>
-            <a:r>
-              <a:rPr lang="en-US" dirty="0"/>
-              <a:t>[include image of the value string and its parts]</a:t>
-            </a:r>
-          </a:p>
-          <a:p>
+              <a:t>Termination condition: After each </a:t>
+            </a:r>
+            <a:r>
+              <a:rPr lang="en-US" dirty="0" err="1" smtClean="0"/>
+              <a:t>MapReduce</a:t>
+            </a:r>
             <a:r>
               <a:rPr lang="en-US" dirty="0" smtClean="0"/>
-              <a:t>value </a:t>
-            </a:r>
-            <a:r>
-              <a:rPr lang="en-US" dirty="0"/>
-              <a:t>is a string containing a node number, which block the node came from (if applicable), the PageRank of the node, and the lists of </a:t>
-            </a:r>
-          </a:p>
-          <a:p>
-            <a:r>
-              <a:rPr lang="en-US" dirty="0" err="1"/>
-              <a:t>outlink</a:t>
-            </a:r>
-            <a:r>
-              <a:rPr lang="en-US" dirty="0"/>
-              <a:t> nodes and their corresponding blocks, all delimited by "_".</a:t>
-            </a:r>
-          </a:p>
-          <a:p>
+              <a:t> phase, take the average residual across all the blocks. If the average residual falls below an error bound (0.001 in our case), the </a:t>
+            </a:r>
+            <a:r>
+              <a:rPr lang="en-US" dirty="0" err="1" smtClean="0"/>
+              <a:t>PageRanks</a:t>
+            </a:r>
             <a:r>
               <a:rPr lang="en-US" dirty="0" smtClean="0"/>
-              <a:t>parsing</a:t>
-            </a:r>
-            <a:r>
-              <a:rPr lang="en-US" dirty="0"/>
-              <a:t>/ constructing value fields same as in simple PageRank.</a:t>
-            </a:r>
-          </a:p>
-          <a:p>
+              <a:t> have converged accurately and </a:t>
+            </a:r>
+            <a:r>
+              <a:rPr lang="en-US" dirty="0" err="1" smtClean="0"/>
+              <a:t>MapReduces</a:t>
+            </a:r>
             <a:r>
               <a:rPr lang="en-US" dirty="0" smtClean="0"/>
-              <a:t>map </a:t>
-            </a:r>
-            <a:r>
-              <a:rPr lang="en-US" dirty="0"/>
-              <a:t>inputs/ reducer </a:t>
-            </a:r>
-            <a:r>
-              <a:rPr lang="en-US" dirty="0" smtClean="0"/>
-              <a:t>outputs:</a:t>
-            </a:r>
-          </a:p>
-          <a:p>
-            <a:pPr lvl="1"/>
-            <a:r>
-              <a:rPr lang="en-US" dirty="0" err="1" smtClean="0"/>
-              <a:t>todo</a:t>
-            </a:r>
+              <a:t> terminates.</a:t>
+            </a:r>
+          </a:p>
+          <a:p>
             <a:endParaRPr lang="en-US" dirty="0"/>
           </a:p>
           <a:p>
-            <a:r>
-              <a:rPr lang="en-US" dirty="0" smtClean="0"/>
-              <a:t>map </a:t>
-            </a:r>
-            <a:r>
-              <a:rPr lang="en-US" dirty="0"/>
-              <a:t>outputs/ reducer </a:t>
-            </a:r>
-            <a:r>
-              <a:rPr lang="en-US" dirty="0" smtClean="0"/>
-              <a:t>inputs:</a:t>
-            </a:r>
-          </a:p>
-          <a:p>
-            <a:pPr lvl="1"/>
-            <a:r>
-              <a:rPr lang="en-US" dirty="0" err="1" smtClean="0"/>
-              <a:t>todo</a:t>
-            </a:r>
             <a:endParaRPr lang="en-US" dirty="0"/>
           </a:p>
         </p:txBody>
       </p:sp>
+      <p:pic>
+        <p:nvPicPr>
+          <p:cNvPr id="5" name="Picture 2"/>
+          <p:cNvPicPr>
+            <a:picLocks noChangeAspect="1" noChangeArrowheads="1"/>
+          </p:cNvPicPr>
+          <p:nvPr/>
+        </p:nvPicPr>
+        <p:blipFill>
+          <a:blip r:embed="rId2">
+            <a:extLst>
+              <a:ext uri="{28A0092B-C50C-407E-A947-70E740481C1C}">
+                <a14:useLocalDpi xmlns:a14="http://schemas.microsoft.com/office/drawing/2010/main" val="0"/>
+              </a:ext>
+            </a:extLst>
+          </a:blip>
+          <a:srcRect/>
+          <a:stretch>
+            <a:fillRect/>
+          </a:stretch>
+        </p:blipFill>
+        <p:spPr bwMode="auto">
+          <a:xfrm>
+            <a:off x="2971798" y="2403976"/>
+            <a:ext cx="2667001" cy="339224"/>
+          </a:xfrm>
+          <a:prstGeom prst="rect">
+            <a:avLst/>
+          </a:prstGeom>
+          <a:noFill/>
+          <a:ln>
+            <a:noFill/>
+          </a:ln>
+          <a:effectLst/>
+          <a:extLst>
+            <a:ext uri="{909E8E84-426E-40DD-AFC4-6F175D3DCCD1}">
+              <a14:hiddenFill xmlns:a14="http://schemas.microsoft.com/office/drawing/2010/main">
+                <a:solidFill>
+                  <a:schemeClr val="accent1"/>
+                </a:solidFill>
+              </a14:hiddenFill>
+            </a:ext>
+            <a:ext uri="{91240B29-F687-4F45-9708-019B960494DF}">
+              <a14:hiddenLine xmlns:a14="http://schemas.microsoft.com/office/drawing/2010/main" w="9525">
+                <a:solidFill>
+                  <a:schemeClr val="tx1"/>
+                </a:solidFill>
+                <a:miter lim="800000"/>
+                <a:headEnd/>
+                <a:tailEnd/>
+              </a14:hiddenLine>
+            </a:ext>
+            <a:ext uri="{AF507438-7753-43E0-B8FC-AC1667EBCBE1}">
+              <a14:hiddenEffects xmlns:a14="http://schemas.microsoft.com/office/drawing/2010/main">
+                <a:effectLst>
+                  <a:outerShdw dist="35921" dir="2700000" algn="ctr" rotWithShape="0">
+                    <a:schemeClr val="bg2"/>
+                  </a:outerShdw>
+                </a:effectLst>
+              </a14:hiddenEffects>
+            </a:ext>
+          </a:extLst>
+        </p:spPr>
+      </p:pic>
     </p:spTree>
     <p:extLst>
       <p:ext uri="{BB962C8B-B14F-4D97-AF65-F5344CB8AC3E}">
-        <p14:creationId xmlns:p14="http://schemas.microsoft.com/office/powerpoint/2010/main" val="1981770746"/>
+        <p14:creationId xmlns:p14="http://schemas.microsoft.com/office/powerpoint/2010/main" val="896381283"/>
       </p:ext>
     </p:extLst>
   </p:cSld>
@@ -4404,7 +5627,7 @@
           <a:p>
             <a:r>
               <a:rPr lang="en-US" sz="4000" dirty="0" smtClean="0"/>
-              <a:t>Results and Discussion</a:t>
+              <a:t>Blocked PageRank Implementation</a:t>
             </a:r>
             <a:endParaRPr lang="en-US" sz="4000" dirty="0"/>
           </a:p>
@@ -4422,18 +5645,118 @@
         </p:nvSpPr>
         <p:spPr/>
         <p:txBody>
-          <a:bodyPr/>
-          <a:lstStyle/>
-          <a:p>
+          <a:bodyPr>
+            <a:normAutofit fontScale="92500" lnSpcReduction="10000"/>
+          </a:bodyPr>
+          <a:lstStyle/>
+          <a:p>
+            <a:r>
+              <a:rPr lang="en-US" dirty="0"/>
+              <a:t>Mappers and reducers both have the following input/output types </a:t>
+            </a:r>
+          </a:p>
+          <a:p>
+            <a:pPr lvl="1"/>
+            <a:r>
+              <a:rPr lang="en-US" dirty="0"/>
+              <a:t>Key is </a:t>
+            </a:r>
             <a:r>
               <a:rPr lang="en-US" dirty="0" smtClean="0"/>
-              <a:t>Converges faster than Simple PageRank</a:t>
-            </a:r>
-          </a:p>
-          <a:p>
+              <a:t>block number </a:t>
+            </a:r>
+            <a:r>
+              <a:rPr lang="en-US" dirty="0"/>
+              <a:t>of type Text</a:t>
+            </a:r>
+          </a:p>
+          <a:p>
+            <a:pPr lvl="1"/>
             <a:r>
               <a:rPr lang="en-US" dirty="0" smtClean="0"/>
-              <a:t>[include graph]</a:t>
+              <a:t>Value is a string (type Text) containing </a:t>
+            </a:r>
+            <a:r>
+              <a:rPr lang="en-US" dirty="0"/>
+              <a:t>a node number, which block the node came from (if applicable), the PageRank of the node, and the lists of </a:t>
+            </a:r>
+            <a:r>
+              <a:rPr lang="en-US" dirty="0" err="1"/>
+              <a:t>outlink</a:t>
+            </a:r>
+            <a:r>
+              <a:rPr lang="en-US" dirty="0"/>
+              <a:t> nodes and their corresponding blocks, all delimited by </a:t>
+            </a:r>
+            <a:r>
+              <a:rPr lang="en-US" dirty="0" smtClean="0"/>
+              <a:t>"_".</a:t>
+            </a:r>
+          </a:p>
+          <a:p>
+            <a:pPr lvl="1"/>
+            <a:r>
+              <a:rPr lang="en-US" dirty="0" smtClean="0"/>
+              <a:t>[</a:t>
+            </a:r>
+            <a:r>
+              <a:rPr lang="en-US" dirty="0"/>
+              <a:t>include image of the value string and its parts</a:t>
+            </a:r>
+            <a:r>
+              <a:rPr lang="en-US" dirty="0" smtClean="0"/>
+              <a:t>]</a:t>
+            </a:r>
+            <a:endParaRPr lang="en-US" dirty="0"/>
+          </a:p>
+          <a:p>
+            <a:r>
+              <a:rPr lang="en-US" dirty="0"/>
+              <a:t>map inputs/ reducer outputs:</a:t>
+            </a:r>
+          </a:p>
+          <a:p>
+            <a:pPr lvl="1"/>
+            <a:r>
+              <a:rPr lang="en-US" dirty="0"/>
+              <a:t>[image of formats]</a:t>
+            </a:r>
+          </a:p>
+          <a:p>
+            <a:r>
+              <a:rPr lang="en-US" dirty="0"/>
+              <a:t>map outputs/ reducer inputs:</a:t>
+            </a:r>
+          </a:p>
+          <a:p>
+            <a:pPr lvl="1"/>
+            <a:r>
+              <a:rPr lang="en-US" dirty="0"/>
+              <a:t>[image of formats</a:t>
+            </a:r>
+            <a:r>
+              <a:rPr lang="en-US" dirty="0" smtClean="0"/>
+              <a:t>]</a:t>
+            </a:r>
+          </a:p>
+          <a:p>
+            <a:r>
+              <a:rPr lang="en-US" dirty="0" smtClean="0"/>
+              <a:t>Parsing and constructing the string value </a:t>
+            </a:r>
+            <a:r>
+              <a:rPr lang="en-US" dirty="0"/>
+              <a:t>fields </a:t>
+            </a:r>
+            <a:r>
+              <a:rPr lang="en-US" dirty="0" smtClean="0"/>
+              <a:t>is done the same way as in Simple PageRank.</a:t>
+            </a:r>
+          </a:p>
+          <a:p>
+            <a:r>
+              <a:rPr lang="en-US" dirty="0" smtClean="0"/>
+              <a:t>Two Counters: one for the residuals, and another for the number of PageRank iterations per reduce task.</a:t>
             </a:r>
             <a:endParaRPr lang="en-US" dirty="0"/>
           </a:p>
@@ -4442,7 +5765,7 @@
     </p:spTree>
     <p:extLst>
       <p:ext uri="{BB962C8B-B14F-4D97-AF65-F5344CB8AC3E}">
-        <p14:creationId xmlns:p14="http://schemas.microsoft.com/office/powerpoint/2010/main" val="3902977825"/>
+        <p14:creationId xmlns:p14="http://schemas.microsoft.com/office/powerpoint/2010/main" val="1981770746"/>
       </p:ext>
     </p:extLst>
   </p:cSld>
@@ -4690,4 +6013,289 @@
   <a:objectDefaults/>
   <a:extraClrSchemeLst/>
 </a:theme>
+</file>
+
+<file path=ppt/theme/theme2.xml><?xml version="1.0" encoding="utf-8"?>
+<a:theme xmlns:a="http://schemas.openxmlformats.org/drawingml/2006/main" name="Office Theme">
+  <a:themeElements>
+    <a:clrScheme name="Office">
+      <a:dk1>
+        <a:sysClr val="windowText" lastClr="000000"/>
+      </a:dk1>
+      <a:lt1>
+        <a:sysClr val="window" lastClr="FFFFFF"/>
+      </a:lt1>
+      <a:dk2>
+        <a:srgbClr val="1F497D"/>
+      </a:dk2>
+      <a:lt2>
+        <a:srgbClr val="EEECE1"/>
+      </a:lt2>
+      <a:accent1>
+        <a:srgbClr val="4F81BD"/>
+      </a:accent1>
+      <a:accent2>
+        <a:srgbClr val="C0504D"/>
+      </a:accent2>
+      <a:accent3>
+        <a:srgbClr val="9BBB59"/>
+      </a:accent3>
+      <a:accent4>
+        <a:srgbClr val="8064A2"/>
+      </a:accent4>
+      <a:accent5>
+        <a:srgbClr val="4BACC6"/>
+      </a:accent5>
+      <a:accent6>
+        <a:srgbClr val="F79646"/>
+      </a:accent6>
+      <a:hlink>
+        <a:srgbClr val="0000FF"/>
+      </a:hlink>
+      <a:folHlink>
+        <a:srgbClr val="800080"/>
+      </a:folHlink>
+    </a:clrScheme>
+    <a:fontScheme name="Office">
+      <a:majorFont>
+        <a:latin typeface="Calibri"/>
+        <a:ea typeface=""/>
+        <a:cs typeface=""/>
+        <a:font script="Jpan" typeface="ＭＳ Ｐゴシック"/>
+        <a:font script="Hang" typeface="맑은 고딕"/>
+        <a:font script="Hans" typeface="宋体"/>
+        <a:font script="Hant" typeface="新細明體"/>
+        <a:font script="Arab" typeface="Times New Roman"/>
+        <a:font script="Hebr" typeface="Times New Roman"/>
+        <a:font script="Thai" typeface="Angsana New"/>
+        <a:font script="Ethi" typeface="Nyala"/>
+        <a:font script="Beng" typeface="Vrinda"/>
+        <a:font script="Gujr" typeface="Shruti"/>
+        <a:font script="Khmr" typeface="MoolBoran"/>
+        <a:font script="Knda" typeface="Tunga"/>
+        <a:font script="Guru" typeface="Raavi"/>
+        <a:font script="Cans" typeface="Euphemia"/>
+        <a:font script="Cher" typeface="Plantagenet Cherokee"/>
+        <a:font script="Yiii" typeface="Microsoft Yi Baiti"/>
+        <a:font script="Tibt" typeface="Microsoft Himalaya"/>
+        <a:font script="Thaa" typeface="MV Boli"/>
+        <a:font script="Deva" typeface="Mangal"/>
+        <a:font script="Telu" typeface="Gautami"/>
+        <a:font script="Taml" typeface="Latha"/>
+        <a:font script="Syrc" typeface="Estrangelo Edessa"/>
+        <a:font script="Orya" typeface="Kalinga"/>
+        <a:font script="Mlym" typeface="Kartika"/>
+        <a:font script="Laoo" typeface="DokChampa"/>
+        <a:font script="Sinh" typeface="Iskoola Pota"/>
+        <a:font script="Mong" typeface="Mongolian Baiti"/>
+        <a:font script="Viet" typeface="Times New Roman"/>
+        <a:font script="Uigh" typeface="Microsoft Uighur"/>
+        <a:font script="Geor" typeface="Sylfaen"/>
+      </a:majorFont>
+      <a:minorFont>
+        <a:latin typeface="Calibri"/>
+        <a:ea typeface=""/>
+        <a:cs typeface=""/>
+        <a:font script="Jpan" typeface="ＭＳ Ｐゴシック"/>
+        <a:font script="Hang" typeface="맑은 고딕"/>
+        <a:font script="Hans" typeface="宋体"/>
+        <a:font script="Hant" typeface="新細明體"/>
+        <a:font script="Arab" typeface="Arial"/>
+        <a:font script="Hebr" typeface="Arial"/>
+        <a:font script="Thai" typeface="Cordia New"/>
+        <a:font script="Ethi" typeface="Nyala"/>
+        <a:font script="Beng" typeface="Vrinda"/>
+        <a:font script="Gujr" typeface="Shruti"/>
+        <a:font script="Khmr" typeface="DaunPenh"/>
+        <a:font script="Knda" typeface="Tunga"/>
+        <a:font script="Guru" typeface="Raavi"/>
+        <a:font script="Cans" typeface="Euphemia"/>
+        <a:font script="Cher" typeface="Plantagenet Cherokee"/>
+        <a:font script="Yiii" typeface="Microsoft Yi Baiti"/>
+        <a:font script="Tibt" typeface="Microsoft Himalaya"/>
+        <a:font script="Thaa" typeface="MV Boli"/>
+        <a:font script="Deva" typeface="Mangal"/>
+        <a:font script="Telu" typeface="Gautami"/>
+        <a:font script="Taml" typeface="Latha"/>
+        <a:font script="Syrc" typeface="Estrangelo Edessa"/>
+        <a:font script="Orya" typeface="Kalinga"/>
+        <a:font script="Mlym" typeface="Kartika"/>
+        <a:font script="Laoo" typeface="DokChampa"/>
+        <a:font script="Sinh" typeface="Iskoola Pota"/>
+        <a:font script="Mong" typeface="Mongolian Baiti"/>
+        <a:font script="Viet" typeface="Arial"/>
+        <a:font script="Uigh" typeface="Microsoft Uighur"/>
+        <a:font script="Geor" typeface="Sylfaen"/>
+      </a:minorFont>
+    </a:fontScheme>
+    <a:fmtScheme name="Office">
+      <a:fillStyleLst>
+        <a:solidFill>
+          <a:schemeClr val="phClr"/>
+        </a:solidFill>
+        <a:gradFill rotWithShape="1">
+          <a:gsLst>
+            <a:gs pos="0">
+              <a:schemeClr val="phClr">
+                <a:tint val="50000"/>
+                <a:satMod val="300000"/>
+              </a:schemeClr>
+            </a:gs>
+            <a:gs pos="35000">
+              <a:schemeClr val="phClr">
+                <a:tint val="37000"/>
+                <a:satMod val="300000"/>
+              </a:schemeClr>
+            </a:gs>
+            <a:gs pos="100000">
+              <a:schemeClr val="phClr">
+                <a:tint val="15000"/>
+                <a:satMod val="350000"/>
+              </a:schemeClr>
+            </a:gs>
+          </a:gsLst>
+          <a:lin ang="16200000" scaled="1"/>
+        </a:gradFill>
+        <a:gradFill rotWithShape="1">
+          <a:gsLst>
+            <a:gs pos="0">
+              <a:schemeClr val="phClr">
+                <a:shade val="51000"/>
+                <a:satMod val="130000"/>
+              </a:schemeClr>
+            </a:gs>
+            <a:gs pos="80000">
+              <a:schemeClr val="phClr">
+                <a:shade val="93000"/>
+                <a:satMod val="130000"/>
+              </a:schemeClr>
+            </a:gs>
+            <a:gs pos="100000">
+              <a:schemeClr val="phClr">
+                <a:shade val="94000"/>
+                <a:satMod val="135000"/>
+              </a:schemeClr>
+            </a:gs>
+          </a:gsLst>
+          <a:lin ang="16200000" scaled="0"/>
+        </a:gradFill>
+      </a:fillStyleLst>
+      <a:lnStyleLst>
+        <a:ln w="9525" cap="flat" cmpd="sng" algn="ctr">
+          <a:solidFill>
+            <a:schemeClr val="phClr">
+              <a:shade val="95000"/>
+              <a:satMod val="105000"/>
+            </a:schemeClr>
+          </a:solidFill>
+          <a:prstDash val="solid"/>
+        </a:ln>
+        <a:ln w="25400" cap="flat" cmpd="sng" algn="ctr">
+          <a:solidFill>
+            <a:schemeClr val="phClr"/>
+          </a:solidFill>
+          <a:prstDash val="solid"/>
+        </a:ln>
+        <a:ln w="38100" cap="flat" cmpd="sng" algn="ctr">
+          <a:solidFill>
+            <a:schemeClr val="phClr"/>
+          </a:solidFill>
+          <a:prstDash val="solid"/>
+        </a:ln>
+      </a:lnStyleLst>
+      <a:effectStyleLst>
+        <a:effectStyle>
+          <a:effectLst>
+            <a:outerShdw blurRad="40000" dist="20000" dir="5400000" rotWithShape="0">
+              <a:srgbClr val="000000">
+                <a:alpha val="38000"/>
+              </a:srgbClr>
+            </a:outerShdw>
+          </a:effectLst>
+        </a:effectStyle>
+        <a:effectStyle>
+          <a:effectLst>
+            <a:outerShdw blurRad="40000" dist="23000" dir="5400000" rotWithShape="0">
+              <a:srgbClr val="000000">
+                <a:alpha val="35000"/>
+              </a:srgbClr>
+            </a:outerShdw>
+          </a:effectLst>
+        </a:effectStyle>
+        <a:effectStyle>
+          <a:effectLst>
+            <a:outerShdw blurRad="40000" dist="23000" dir="5400000" rotWithShape="0">
+              <a:srgbClr val="000000">
+                <a:alpha val="35000"/>
+              </a:srgbClr>
+            </a:outerShdw>
+          </a:effectLst>
+          <a:scene3d>
+            <a:camera prst="orthographicFront">
+              <a:rot lat="0" lon="0" rev="0"/>
+            </a:camera>
+            <a:lightRig rig="threePt" dir="t">
+              <a:rot lat="0" lon="0" rev="1200000"/>
+            </a:lightRig>
+          </a:scene3d>
+          <a:sp3d>
+            <a:bevelT w="63500" h="25400"/>
+          </a:sp3d>
+        </a:effectStyle>
+      </a:effectStyleLst>
+      <a:bgFillStyleLst>
+        <a:solidFill>
+          <a:schemeClr val="phClr"/>
+        </a:solidFill>
+        <a:gradFill rotWithShape="1">
+          <a:gsLst>
+            <a:gs pos="0">
+              <a:schemeClr val="phClr">
+                <a:tint val="40000"/>
+                <a:satMod val="350000"/>
+              </a:schemeClr>
+            </a:gs>
+            <a:gs pos="40000">
+              <a:schemeClr val="phClr">
+                <a:tint val="45000"/>
+                <a:shade val="99000"/>
+                <a:satMod val="350000"/>
+              </a:schemeClr>
+            </a:gs>
+            <a:gs pos="100000">
+              <a:schemeClr val="phClr">
+                <a:shade val="20000"/>
+                <a:satMod val="255000"/>
+              </a:schemeClr>
+            </a:gs>
+          </a:gsLst>
+          <a:path path="circle">
+            <a:fillToRect l="50000" t="-80000" r="50000" b="180000"/>
+          </a:path>
+        </a:gradFill>
+        <a:gradFill rotWithShape="1">
+          <a:gsLst>
+            <a:gs pos="0">
+              <a:schemeClr val="phClr">
+                <a:tint val="80000"/>
+                <a:satMod val="300000"/>
+              </a:schemeClr>
+            </a:gs>
+            <a:gs pos="100000">
+              <a:schemeClr val="phClr">
+                <a:shade val="30000"/>
+                <a:satMod val="200000"/>
+              </a:schemeClr>
+            </a:gs>
+          </a:gsLst>
+          <a:path path="circle">
+            <a:fillToRect l="50000" t="50000" r="50000" b="50000"/>
+          </a:path>
+        </a:gradFill>
+      </a:bgFillStyleLst>
+    </a:fmtScheme>
+  </a:themeElements>
+  <a:objectDefaults/>
+  <a:extraClrSchemeLst/>
+</a:theme>
 </file>
</xml_diff>

<commit_message>
final README. final presentation (minus random partition slide)
</commit_message>
<xml_diff>
--- a/presentation.pptx
+++ b/presentation.pptx
@@ -4907,49 +4907,94 @@
               <a:rPr lang="en-US" dirty="0" smtClean="0"/>
               <a:t>"_“.</a:t>
             </a:r>
-            <a:endParaRPr lang="en-US" dirty="0"/>
+          </a:p>
+          <a:p>
+            <a:r>
+              <a:rPr lang="en-US" dirty="0"/>
+              <a:t>M</a:t>
+            </a:r>
+            <a:r>
+              <a:rPr lang="en-US" dirty="0" smtClean="0"/>
+              <a:t>ap input: </a:t>
+            </a:r>
           </a:p>
           <a:p>
             <a:pPr lvl="1"/>
             <a:r>
+              <a:rPr lang="en-US" dirty="0" smtClean="0"/>
+              <a:t>&lt;</a:t>
+            </a:r>
+            <a:r>
+              <a:rPr lang="en-US" dirty="0" err="1" smtClean="0"/>
+              <a:t>u;PR</a:t>
+            </a:r>
+            <a:r>
+              <a:rPr lang="en-US" dirty="0" smtClean="0"/>
+              <a:t>(u)_{v | u-&gt;v}&gt;</a:t>
+            </a:r>
+          </a:p>
+          <a:p>
+            <a:r>
+              <a:rPr lang="en-US" dirty="0" smtClean="0"/>
+              <a:t>Map outputs/ Reducer input: </a:t>
+            </a:r>
+          </a:p>
+          <a:p>
+            <a:pPr lvl="1"/>
+            <a:r>
+              <a:rPr lang="en-US" dirty="0" smtClean="0"/>
+              <a:t>&lt;</a:t>
+            </a:r>
+            <a:r>
+              <a:rPr lang="en-US" dirty="0" err="1" smtClean="0"/>
+              <a:t>u;PR</a:t>
+            </a:r>
+            <a:r>
+              <a:rPr lang="en-US" dirty="0" smtClean="0"/>
+              <a:t>(u)_</a:t>
+            </a:r>
+            <a:r>
               <a:rPr lang="en-US" dirty="0"/>
-              <a:t>[include image of the value string and its parts</a:t>
-            </a:r>
-            <a:r>
-              <a:rPr lang="en-US" dirty="0" smtClean="0"/>
-              <a:t>]</a:t>
-            </a:r>
-          </a:p>
-          <a:p>
-            <a:r>
-              <a:rPr lang="en-US" dirty="0" smtClean="0"/>
-              <a:t>map </a:t>
-            </a:r>
-            <a:r>
-              <a:rPr lang="en-US" dirty="0"/>
-              <a:t>inputs/ reducer outputs:</a:t>
+              <a:t>{v | u-&gt;v</a:t>
+            </a:r>
+            <a:r>
+              <a:rPr lang="en-US" dirty="0" smtClean="0"/>
+              <a:t>}&gt;, &lt;{</a:t>
+            </a:r>
+            <a:r>
+              <a:rPr lang="en-US" dirty="0" err="1" smtClean="0"/>
+              <a:t>v;PR</a:t>
+            </a:r>
+            <a:r>
+              <a:rPr lang="en-US" dirty="0" smtClean="0"/>
+              <a:t>(u)/N_-1} | u-&gt;v&gt;</a:t>
+            </a:r>
+          </a:p>
+          <a:p>
+            <a:r>
+              <a:rPr lang="en-US" dirty="0" smtClean="0"/>
+              <a:t>Reducer output: </a:t>
             </a:r>
           </a:p>
           <a:p>
             <a:pPr lvl="1"/>
             <a:r>
               <a:rPr lang="en-US" dirty="0" smtClean="0"/>
-              <a:t>[image of formats]</a:t>
-            </a:r>
-            <a:endParaRPr lang="en-US" dirty="0"/>
-          </a:p>
-          <a:p>
-            <a:r>
-              <a:rPr lang="en-US" dirty="0"/>
-              <a:t>map outputs/ reducer inputs:</a:t>
-            </a:r>
-          </a:p>
-          <a:p>
-            <a:pPr lvl="1"/>
-            <a:r>
-              <a:rPr lang="en-US" dirty="0"/>
-              <a:t>[image of formats]</a:t>
-            </a:r>
+              <a:t>&lt;</a:t>
+            </a:r>
+            <a:r>
+              <a:rPr lang="en-US" dirty="0" err="1" smtClean="0"/>
+              <a:t>v;Pr</a:t>
+            </a:r>
+            <a:r>
+              <a:rPr lang="en-US" baseline="-25000" dirty="0" err="1" smtClean="0"/>
+              <a:t>new</a:t>
+            </a:r>
+            <a:r>
+              <a:rPr lang="en-US" dirty="0" smtClean="0"/>
+              <a:t>(v)_{w | v-&gt;w}&gt;</a:t>
+            </a:r>
+            <a:endParaRPr lang="en-US" baseline="-25000" dirty="0"/>
           </a:p>
           <a:p>
             <a:r>
@@ -4998,7 +5043,7 @@
             </a:r>
             <a:r>
               <a:rPr lang="en-US" dirty="0" smtClean="0"/>
-              <a:t>residuals</a:t>
+              <a:t>residuals.</a:t>
             </a:r>
             <a:endParaRPr lang="en-US" dirty="0"/>
           </a:p>
@@ -5646,7 +5691,7 @@
         <p:spPr/>
         <p:txBody>
           <a:bodyPr>
-            <a:normAutofit fontScale="92500" lnSpcReduction="10000"/>
+            <a:normAutofit fontScale="92500" lnSpcReduction="20000"/>
           </a:bodyPr>
           <a:lstStyle/>
           <a:p>
@@ -5692,52 +5737,241 @@
               <a:rPr lang="en-US" dirty="0" smtClean="0"/>
               <a:t>"_".</a:t>
             </a:r>
+            <a:endParaRPr lang="en-US" dirty="0"/>
+          </a:p>
+          <a:p>
+            <a:r>
+              <a:rPr lang="en-US" dirty="0"/>
+              <a:t>Map input: </a:t>
+            </a:r>
           </a:p>
           <a:p>
             <a:pPr lvl="1"/>
             <a:r>
               <a:rPr lang="en-US" dirty="0" smtClean="0"/>
-              <a:t>[</a:t>
+              <a:t>&lt;</a:t>
             </a:r>
             <a:r>
               <a:rPr lang="en-US" dirty="0"/>
-              <a:t>include image of the value string and its parts</a:t>
-            </a:r>
-            <a:r>
-              <a:rPr lang="en-US" dirty="0" smtClean="0"/>
-              <a:t>]</a:t>
+              <a:t>b</a:t>
+            </a:r>
+            <a:r>
+              <a:rPr lang="pl-PL" dirty="0" smtClean="0"/>
+              <a:t>(u);u</a:t>
+            </a:r>
+            <a:r>
+              <a:rPr lang="en-US" dirty="0"/>
+              <a:t>_</a:t>
+            </a:r>
+            <a:r>
+              <a:rPr lang="pl-PL" dirty="0" smtClean="0"/>
+              <a:t>-1</a:t>
+            </a:r>
+            <a:r>
+              <a:rPr lang="en-US" dirty="0" smtClean="0"/>
+              <a:t>_</a:t>
+            </a:r>
+            <a:r>
+              <a:rPr lang="pl-PL" dirty="0" smtClean="0"/>
+              <a:t>PR(u)</a:t>
+            </a:r>
+            <a:r>
+              <a:rPr lang="en-US" dirty="0" smtClean="0"/>
+              <a:t>_</a:t>
+            </a:r>
+            <a:r>
+              <a:rPr lang="pl-PL" dirty="0" smtClean="0"/>
+              <a:t>{b(v)</a:t>
+            </a:r>
+            <a:r>
+              <a:rPr lang="en-US" dirty="0"/>
+              <a:t>~</a:t>
+            </a:r>
+            <a:r>
+              <a:rPr lang="pl-PL" dirty="0" smtClean="0"/>
+              <a:t>v </a:t>
+            </a:r>
+            <a:r>
+              <a:rPr lang="pl-PL" dirty="0"/>
+              <a:t>| u-&gt;v</a:t>
+            </a:r>
+            <a:r>
+              <a:rPr lang="pl-PL" dirty="0" smtClean="0"/>
+              <a:t>}</a:t>
+            </a:r>
+            <a:r>
+              <a:rPr lang="en-US" dirty="0" smtClean="0"/>
+              <a:t>&gt;</a:t>
             </a:r>
             <a:endParaRPr lang="en-US" dirty="0"/>
           </a:p>
           <a:p>
             <a:r>
               <a:rPr lang="en-US" dirty="0"/>
-              <a:t>map inputs/ reducer outputs:</a:t>
+              <a:t>Map outputs/ Reducer input: </a:t>
             </a:r>
           </a:p>
           <a:p>
             <a:pPr lvl="1"/>
             <a:r>
               <a:rPr lang="en-US" dirty="0"/>
-              <a:t>[image of formats]</a:t>
-            </a:r>
-          </a:p>
-          <a:p>
+              <a:t>&lt;b</a:t>
+            </a:r>
+            <a:r>
+              <a:rPr lang="pl-PL" dirty="0"/>
+              <a:t>(u</a:t>
+            </a:r>
+            <a:r>
+              <a:rPr lang="pl-PL" dirty="0" smtClean="0"/>
+              <a:t>);u</a:t>
+            </a:r>
+            <a:r>
+              <a:rPr lang="en-US" dirty="0" smtClean="0"/>
+              <a:t>_</a:t>
+            </a:r>
+            <a:r>
+              <a:rPr lang="pl-PL" dirty="0" smtClean="0"/>
+              <a:t>-1</a:t>
+            </a:r>
+            <a:r>
+              <a:rPr lang="en-US" dirty="0" smtClean="0"/>
+              <a:t>_</a:t>
+            </a:r>
+            <a:r>
+              <a:rPr lang="pl-PL" dirty="0" smtClean="0"/>
+              <a:t>PR(u)</a:t>
+            </a:r>
+            <a:r>
+              <a:rPr lang="en-US" dirty="0" smtClean="0"/>
+              <a:t>_</a:t>
+            </a:r>
+            <a:r>
+              <a:rPr lang="pl-PL" dirty="0" smtClean="0"/>
+              <a:t>{b(v)</a:t>
+            </a:r>
+            <a:r>
+              <a:rPr lang="en-US" dirty="0" smtClean="0"/>
+              <a:t>~</a:t>
+            </a:r>
+            <a:r>
+              <a:rPr lang="pl-PL" dirty="0" smtClean="0"/>
+              <a:t>v </a:t>
+            </a:r>
+            <a:r>
+              <a:rPr lang="pl-PL" dirty="0"/>
+              <a:t>| u-&gt;v}</a:t>
+            </a:r>
             <a:r>
               <a:rPr lang="en-US" dirty="0"/>
-              <a:t>map outputs/ reducer inputs:</a:t>
+              <a:t>&gt;</a:t>
+            </a:r>
+            <a:r>
+              <a:rPr lang="en-US" dirty="0" smtClean="0"/>
+              <a:t>, &lt;</a:t>
+            </a:r>
+            <a:r>
+              <a:rPr lang="pl-PL" dirty="0" smtClean="0"/>
+              <a:t>b(v);v</a:t>
+            </a:r>
+            <a:r>
+              <a:rPr lang="en-US" dirty="0" smtClean="0"/>
+              <a:t>_</a:t>
+            </a:r>
+            <a:r>
+              <a:rPr lang="pl-PL" dirty="0" smtClean="0"/>
+              <a:t>b(u)</a:t>
+            </a:r>
+            <a:r>
+              <a:rPr lang="en-US" dirty="0" smtClean="0"/>
+              <a:t>_</a:t>
+            </a:r>
+            <a:r>
+              <a:rPr lang="pl-PL" dirty="0" smtClean="0"/>
+              <a:t>PR(u</a:t>
+            </a:r>
+            <a:r>
+              <a:rPr lang="pl-PL" dirty="0"/>
+              <a:t>)/</a:t>
+            </a:r>
+            <a:r>
+              <a:rPr lang="pl-PL" dirty="0" smtClean="0"/>
+              <a:t>N</a:t>
+            </a:r>
+            <a:r>
+              <a:rPr lang="en-US" dirty="0"/>
+              <a:t>_</a:t>
+            </a:r>
+            <a:r>
+              <a:rPr lang="pl-PL" dirty="0" smtClean="0"/>
+              <a:t>-1</a:t>
+            </a:r>
+            <a:r>
+              <a:rPr lang="en-US" dirty="0" smtClean="0"/>
+              <a:t>&gt;</a:t>
+            </a:r>
+            <a:endParaRPr lang="en-US" dirty="0"/>
+          </a:p>
+          <a:p>
+            <a:r>
+              <a:rPr lang="en-US" dirty="0"/>
+              <a:t>Reducer output: </a:t>
             </a:r>
           </a:p>
           <a:p>
             <a:pPr lvl="1"/>
             <a:r>
-              <a:rPr lang="en-US" dirty="0"/>
-              <a:t>[image of formats</a:t>
-            </a:r>
-            <a:r>
-              <a:rPr lang="en-US" dirty="0" smtClean="0"/>
-              <a:t>]</a:t>
-            </a:r>
+              <a:rPr lang="en-US" dirty="0" smtClean="0"/>
+              <a:t>&lt;</a:t>
+            </a:r>
+            <a:r>
+              <a:rPr lang="pl-PL" dirty="0" smtClean="0"/>
+              <a:t>b(u);u</a:t>
+            </a:r>
+            <a:r>
+              <a:rPr lang="en-US" dirty="0" smtClean="0"/>
+              <a:t>_</a:t>
+            </a:r>
+            <a:r>
+              <a:rPr lang="pl-PL" dirty="0" smtClean="0"/>
+              <a:t>-1</a:t>
+            </a:r>
+            <a:r>
+              <a:rPr lang="en-US" dirty="0" smtClean="0"/>
+              <a:t>_</a:t>
+            </a:r>
+            <a:r>
+              <a:rPr lang="pl-PL" dirty="0" smtClean="0"/>
+              <a:t>PR(u)</a:t>
+            </a:r>
+            <a:r>
+              <a:rPr lang="en-US" dirty="0" smtClean="0"/>
+              <a:t>_</a:t>
+            </a:r>
+            <a:r>
+              <a:rPr lang="pl-PL" dirty="0" smtClean="0"/>
+              <a:t>{b(v)</a:t>
+            </a:r>
+            <a:r>
+              <a:rPr lang="en-US" dirty="0" smtClean="0"/>
+              <a:t>~</a:t>
+            </a:r>
+            <a:r>
+              <a:rPr lang="pl-PL" dirty="0" smtClean="0"/>
+              <a:t>v </a:t>
+            </a:r>
+            <a:r>
+              <a:rPr lang="pl-PL" dirty="0"/>
+              <a:t>| u-&gt;v</a:t>
+            </a:r>
+            <a:r>
+              <a:rPr lang="pl-PL" dirty="0" smtClean="0"/>
+              <a:t>}</a:t>
+            </a:r>
+            <a:r>
+              <a:rPr lang="en-US" dirty="0" smtClean="0"/>
+              <a:t>&gt;</a:t>
+            </a:r>
+            <a:endParaRPr lang="en-US" baseline="-25000" dirty="0"/>
           </a:p>
           <a:p>
             <a:r>

</xml_diff>